<commit_message>
New graphics for 3.16
</commit_message>
<xml_diff>
--- a/source/en/getting_started/InVEST_UserGuide_graphics.pptx
+++ b/source/en/getting_started/InVEST_UserGuide_graphics.pptx
@@ -5,10 +5,16 @@
     <p:sldMasterId id="2147483648" r:id="rId1"/>
   </p:sldMasterIdLst>
   <p:sldIdLst>
-    <p:sldId id="256" r:id="rId2"/>
-    <p:sldId id="259" r:id="rId3"/>
-    <p:sldId id="257" r:id="rId4"/>
-    <p:sldId id="258" r:id="rId5"/>
+    <p:sldId id="265" r:id="rId2"/>
+    <p:sldId id="261" r:id="rId3"/>
+    <p:sldId id="268" r:id="rId4"/>
+    <p:sldId id="263" r:id="rId5"/>
+    <p:sldId id="264" r:id="rId6"/>
+    <p:sldId id="260" r:id="rId7"/>
+    <p:sldId id="256" r:id="rId8"/>
+    <p:sldId id="259" r:id="rId9"/>
+    <p:sldId id="257" r:id="rId10"/>
+    <p:sldId id="258" r:id="rId11"/>
   </p:sldIdLst>
   <p:sldSz cx="12192000" cy="6858000"/>
   <p:notesSz cx="6858000" cy="9144000"/>
@@ -107,6 +113,11 @@
       </a:defRPr>
     </a:lvl9pPr>
   </p:defaultTextStyle>
+  <p:extLst>
+    <p:ext uri="{EFAFB233-063F-42B5-8137-9DF3F51BA10A}">
+      <p15:sldGuideLst xmlns:p15="http://schemas.microsoft.com/office/powerpoint/2012/main"/>
+    </p:ext>
+  </p:extLst>
 </p:presentation>
 </file>
 
@@ -257,7 +268,7 @@
           <a:p>
             <a:fld id="{A4570EBC-7125-4B5E-B99D-E465C94DD824}" type="datetimeFigureOut">
               <a:rPr lang="en-US" smtClean="0"/>
-              <a:t>6/10/2024</a:t>
+              <a:t>6/17/2025</a:t>
             </a:fld>
             <a:endParaRPr lang="en-US"/>
           </a:p>
@@ -455,7 +466,7 @@
           <a:p>
             <a:fld id="{A4570EBC-7125-4B5E-B99D-E465C94DD824}" type="datetimeFigureOut">
               <a:rPr lang="en-US" smtClean="0"/>
-              <a:t>6/10/2024</a:t>
+              <a:t>6/17/2025</a:t>
             </a:fld>
             <a:endParaRPr lang="en-US"/>
           </a:p>
@@ -663,7 +674,7 @@
           <a:p>
             <a:fld id="{A4570EBC-7125-4B5E-B99D-E465C94DD824}" type="datetimeFigureOut">
               <a:rPr lang="en-US" smtClean="0"/>
-              <a:t>6/10/2024</a:t>
+              <a:t>6/17/2025</a:t>
             </a:fld>
             <a:endParaRPr lang="en-US"/>
           </a:p>
@@ -861,7 +872,7 @@
           <a:p>
             <a:fld id="{A4570EBC-7125-4B5E-B99D-E465C94DD824}" type="datetimeFigureOut">
               <a:rPr lang="en-US" smtClean="0"/>
-              <a:t>6/10/2024</a:t>
+              <a:t>6/17/2025</a:t>
             </a:fld>
             <a:endParaRPr lang="en-US"/>
           </a:p>
@@ -1136,7 +1147,7 @@
           <a:p>
             <a:fld id="{A4570EBC-7125-4B5E-B99D-E465C94DD824}" type="datetimeFigureOut">
               <a:rPr lang="en-US" smtClean="0"/>
-              <a:t>6/10/2024</a:t>
+              <a:t>6/17/2025</a:t>
             </a:fld>
             <a:endParaRPr lang="en-US"/>
           </a:p>
@@ -1401,7 +1412,7 @@
           <a:p>
             <a:fld id="{A4570EBC-7125-4B5E-B99D-E465C94DD824}" type="datetimeFigureOut">
               <a:rPr lang="en-US" smtClean="0"/>
-              <a:t>6/10/2024</a:t>
+              <a:t>6/17/2025</a:t>
             </a:fld>
             <a:endParaRPr lang="en-US"/>
           </a:p>
@@ -1813,7 +1824,7 @@
           <a:p>
             <a:fld id="{A4570EBC-7125-4B5E-B99D-E465C94DD824}" type="datetimeFigureOut">
               <a:rPr lang="en-US" smtClean="0"/>
-              <a:t>6/10/2024</a:t>
+              <a:t>6/17/2025</a:t>
             </a:fld>
             <a:endParaRPr lang="en-US"/>
           </a:p>
@@ -1954,7 +1965,7 @@
           <a:p>
             <a:fld id="{A4570EBC-7125-4B5E-B99D-E465C94DD824}" type="datetimeFigureOut">
               <a:rPr lang="en-US" smtClean="0"/>
-              <a:t>6/10/2024</a:t>
+              <a:t>6/17/2025</a:t>
             </a:fld>
             <a:endParaRPr lang="en-US"/>
           </a:p>
@@ -2067,7 +2078,7 @@
           <a:p>
             <a:fld id="{A4570EBC-7125-4B5E-B99D-E465C94DD824}" type="datetimeFigureOut">
               <a:rPr lang="en-US" smtClean="0"/>
-              <a:t>6/10/2024</a:t>
+              <a:t>6/17/2025</a:t>
             </a:fld>
             <a:endParaRPr lang="en-US"/>
           </a:p>
@@ -2378,7 +2389,7 @@
           <a:p>
             <a:fld id="{A4570EBC-7125-4B5E-B99D-E465C94DD824}" type="datetimeFigureOut">
               <a:rPr lang="en-US" smtClean="0"/>
-              <a:t>6/10/2024</a:t>
+              <a:t>6/17/2025</a:t>
             </a:fld>
             <a:endParaRPr lang="en-US"/>
           </a:p>
@@ -2666,7 +2677,7 @@
           <a:p>
             <a:fld id="{A4570EBC-7125-4B5E-B99D-E465C94DD824}" type="datetimeFigureOut">
               <a:rPr lang="en-US" smtClean="0"/>
-              <a:t>6/10/2024</a:t>
+              <a:t>6/17/2025</a:t>
             </a:fld>
             <a:endParaRPr lang="en-US"/>
           </a:p>
@@ -2907,7 +2918,7 @@
           <a:p>
             <a:fld id="{A4570EBC-7125-4B5E-B99D-E465C94DD824}" type="datetimeFigureOut">
               <a:rPr lang="en-US" smtClean="0"/>
-              <a:t>6/10/2024</a:t>
+              <a:t>6/17/2025</a:t>
             </a:fld>
             <a:endParaRPr lang="en-US"/>
           </a:p>
@@ -3312,6 +3323,78 @@
   <p:cSld>
     <p:spTree>
       <p:nvGrpSpPr>
+        <p:cNvPr id="1" name="">
+          <a:extLst>
+            <a:ext uri="{FF2B5EF4-FFF2-40B4-BE49-F238E27FC236}">
+              <a16:creationId xmlns:a16="http://schemas.microsoft.com/office/drawing/2014/main" id="{D1BE8984-402A-9DB3-A276-808C51E2354D}"/>
+            </a:ext>
+          </a:extLst>
+        </p:cNvPr>
+        <p:cNvGrpSpPr/>
+        <p:nvPr/>
+      </p:nvGrpSpPr>
+      <p:grpSpPr>
+        <a:xfrm>
+          <a:off x="0" y="0"/>
+          <a:ext cx="0" cy="0"/>
+          <a:chOff x="0" y="0"/>
+          <a:chExt cx="0" cy="0"/>
+        </a:xfrm>
+      </p:grpSpPr>
+      <p:sp>
+        <p:nvSpPr>
+          <p:cNvPr id="2" name="Title 1">
+            <a:extLst>
+              <a:ext uri="{FF2B5EF4-FFF2-40B4-BE49-F238E27FC236}">
+                <a16:creationId xmlns:a16="http://schemas.microsoft.com/office/drawing/2014/main" id="{A9F14C3E-25F5-2081-9DF5-E1CE07596361}"/>
+              </a:ext>
+            </a:extLst>
+          </p:cNvPr>
+          <p:cNvSpPr>
+            <a:spLocks noGrp="1"/>
+          </p:cNvSpPr>
+          <p:nvPr>
+            <p:ph type="ctrTitle"/>
+          </p:nvPr>
+        </p:nvSpPr>
+        <p:spPr/>
+        <p:txBody>
+          <a:bodyPr/>
+          <a:lstStyle/>
+          <a:p>
+            <a:r>
+              <a:rPr lang="en-US"/>
+              <a:t>InVEST 3.16</a:t>
+            </a:r>
+            <a:br>
+              <a:rPr lang="en-US"/>
+            </a:br>
+            <a:r>
+              <a:rPr lang="en-US" sz="4800"/>
+              <a:t>(new settings bar)</a:t>
+            </a:r>
+            <a:endParaRPr lang="en-US"/>
+          </a:p>
+        </p:txBody>
+      </p:sp>
+    </p:spTree>
+    <p:extLst>
+      <p:ext uri="{BB962C8B-B14F-4D97-AF65-F5344CB8AC3E}">
+        <p14:creationId xmlns:p14="http://schemas.microsoft.com/office/powerpoint/2010/main" val="1978021841"/>
+      </p:ext>
+    </p:extLst>
+  </p:cSld>
+  <p:clrMapOvr>
+    <a:masterClrMapping/>
+  </p:clrMapOvr>
+</p:sld>
+</file>
+
+<file path=ppt/slides/slide10.xml><?xml version="1.0" encoding="utf-8"?>
+<p:sld xmlns:a="http://schemas.openxmlformats.org/drawingml/2006/main" xmlns:r="http://schemas.openxmlformats.org/officeDocument/2006/relationships" xmlns:p="http://schemas.openxmlformats.org/presentationml/2006/main">
+  <p:cSld>
+    <p:spTree>
+      <p:nvGrpSpPr>
         <p:cNvPr id="1" name=""/>
         <p:cNvGrpSpPr/>
         <p:nvPr/>
@@ -3326,10 +3409,10 @@
       </p:grpSpPr>
       <p:pic>
         <p:nvPicPr>
-          <p:cNvPr id="5" name="Picture 4">
-            <a:extLst>
-              <a:ext uri="{FF2B5EF4-FFF2-40B4-BE49-F238E27FC236}">
-                <a16:creationId xmlns:a16="http://schemas.microsoft.com/office/drawing/2014/main" id="{1FAFF845-3623-3B72-E2B4-BB9FABA01FFA}"/>
+          <p:cNvPr id="3" name="Picture 2">
+            <a:extLst>
+              <a:ext uri="{FF2B5EF4-FFF2-40B4-BE49-F238E27FC236}">
+                <a16:creationId xmlns:a16="http://schemas.microsoft.com/office/drawing/2014/main" id="{A385944C-64A2-3A34-B15E-A32D6BEE4DE2}"/>
               </a:ext>
             </a:extLst>
           </p:cNvPr>
@@ -3346,8 +3429,8 @@
         </p:blipFill>
         <p:spPr>
           <a:xfrm>
-            <a:off x="1535502" y="1282035"/>
-            <a:ext cx="9462210" cy="5481073"/>
+            <a:off x="2111234" y="1266614"/>
+            <a:ext cx="9598854" cy="5477256"/>
           </a:xfrm>
           <a:prstGeom prst="rect">
             <a:avLst/>
@@ -3356,10 +3439,10 @@
       </p:pic>
       <p:sp>
         <p:nvSpPr>
-          <p:cNvPr id="6" name="TextBox 5">
-            <a:extLst>
-              <a:ext uri="{FF2B5EF4-FFF2-40B4-BE49-F238E27FC236}">
-                <a16:creationId xmlns:a16="http://schemas.microsoft.com/office/drawing/2014/main" id="{BD3DD0F5-4ED4-B11B-76A7-BFF45055FC3A}"/>
+          <p:cNvPr id="7" name="TextBox 6">
+            <a:extLst>
+              <a:ext uri="{FF2B5EF4-FFF2-40B4-BE49-F238E27FC236}">
+                <a16:creationId xmlns:a16="http://schemas.microsoft.com/office/drawing/2014/main" id="{02DC95A2-E121-41CE-9268-61BA294D4808}"/>
               </a:ext>
             </a:extLst>
           </p:cNvPr>
@@ -3368,8 +3451,43 @@
         </p:nvSpPr>
         <p:spPr>
           <a:xfrm>
-            <a:off x="3198649" y="669349"/>
-            <a:ext cx="1746953" cy="369332"/>
+            <a:off x="190836" y="2519393"/>
+            <a:ext cx="1778158" cy="738664"/>
+          </a:xfrm>
+          <a:prstGeom prst="rect">
+            <a:avLst/>
+          </a:prstGeom>
+          <a:noFill/>
+        </p:spPr>
+        <p:txBody>
+          <a:bodyPr wrap="square" rtlCol="0">
+            <a:spAutoFit/>
+          </a:bodyPr>
+          <a:lstStyle/>
+          <a:p>
+            <a:r>
+              <a:rPr lang="en-US" sz="1400" b="1"/>
+              <a:t>Click to view logging messages for this model run </a:t>
+            </a:r>
+          </a:p>
+        </p:txBody>
+      </p:sp>
+      <p:sp>
+        <p:nvSpPr>
+          <p:cNvPr id="8" name="TextBox 7">
+            <a:extLst>
+              <a:ext uri="{FF2B5EF4-FFF2-40B4-BE49-F238E27FC236}">
+                <a16:creationId xmlns:a16="http://schemas.microsoft.com/office/drawing/2014/main" id="{A783F852-105F-259A-E75C-523ED58FA22C}"/>
+              </a:ext>
+            </a:extLst>
+          </p:cNvPr>
+          <p:cNvSpPr txBox="1"/>
+          <p:nvPr/>
+        </p:nvSpPr>
+        <p:spPr>
+          <a:xfrm>
+            <a:off x="7744952" y="392350"/>
+            <a:ext cx="1244636" cy="646331"/>
           </a:xfrm>
           <a:prstGeom prst="rect">
             <a:avLst/>
@@ -3382,138 +3500,17 @@
           </a:bodyPr>
           <a:lstStyle/>
           <a:p>
+            <a:pPr algn="ctr"/>
             <a:r>
               <a:rPr lang="en-US" b="1"/>
-              <a:t>InVEST models</a:t>
-            </a:r>
-          </a:p>
-        </p:txBody>
-      </p:sp>
-      <p:sp>
-        <p:nvSpPr>
-          <p:cNvPr id="7" name="TextBox 6">
-            <a:extLst>
-              <a:ext uri="{FF2B5EF4-FFF2-40B4-BE49-F238E27FC236}">
-                <a16:creationId xmlns:a16="http://schemas.microsoft.com/office/drawing/2014/main" id="{02DC95A2-E121-41CE-9268-61BA294D4808}"/>
-              </a:ext>
-            </a:extLst>
-          </p:cNvPr>
-          <p:cNvSpPr txBox="1"/>
-          <p:nvPr/>
-        </p:nvSpPr>
-        <p:spPr>
-          <a:xfrm>
-            <a:off x="1687902" y="392351"/>
-            <a:ext cx="901850" cy="646331"/>
-          </a:xfrm>
-          <a:prstGeom prst="rect">
-            <a:avLst/>
-          </a:prstGeom>
-          <a:noFill/>
-        </p:spPr>
-        <p:txBody>
-          <a:bodyPr wrap="none" rtlCol="0">
-            <a:spAutoFit/>
-          </a:bodyPr>
-          <a:lstStyle/>
+              <a:t>Logging</a:t>
+            </a:r>
+          </a:p>
           <a:p>
             <a:pPr algn="ctr"/>
             <a:r>
               <a:rPr lang="en-US" b="1"/>
-              <a:t>Home</a:t>
-            </a:r>
-          </a:p>
-          <a:p>
-            <a:pPr algn="ctr"/>
-            <a:r>
-              <a:rPr lang="en-US" b="1"/>
-              <a:t>screen</a:t>
-            </a:r>
-          </a:p>
-        </p:txBody>
-      </p:sp>
-      <p:sp>
-        <p:nvSpPr>
-          <p:cNvPr id="8" name="TextBox 7">
-            <a:extLst>
-              <a:ext uri="{FF2B5EF4-FFF2-40B4-BE49-F238E27FC236}">
-                <a16:creationId xmlns:a16="http://schemas.microsoft.com/office/drawing/2014/main" id="{A783F852-105F-259A-E75C-523ED58FA22C}"/>
-              </a:ext>
-            </a:extLst>
-          </p:cNvPr>
-          <p:cNvSpPr txBox="1"/>
-          <p:nvPr/>
-        </p:nvSpPr>
-        <p:spPr>
-          <a:xfrm>
-            <a:off x="7105291" y="392350"/>
-            <a:ext cx="1372492" cy="646331"/>
-          </a:xfrm>
-          <a:prstGeom prst="rect">
-            <a:avLst/>
-          </a:prstGeom>
-          <a:noFill/>
-        </p:spPr>
-        <p:txBody>
-          <a:bodyPr wrap="none" rtlCol="0">
-            <a:spAutoFit/>
-          </a:bodyPr>
-          <a:lstStyle/>
-          <a:p>
-            <a:pPr algn="ctr"/>
-            <a:r>
-              <a:rPr lang="en-US" b="1"/>
-              <a:t>Previous </a:t>
-            </a:r>
-          </a:p>
-          <a:p>
-            <a:pPr algn="ctr"/>
-            <a:r>
-              <a:rPr lang="en-US" b="1"/>
-              <a:t>model runs</a:t>
-            </a:r>
-          </a:p>
-        </p:txBody>
-      </p:sp>
-      <p:sp>
-        <p:nvSpPr>
-          <p:cNvPr id="9" name="TextBox 8">
-            <a:extLst>
-              <a:ext uri="{FF2B5EF4-FFF2-40B4-BE49-F238E27FC236}">
-                <a16:creationId xmlns:a16="http://schemas.microsoft.com/office/drawing/2014/main" id="{A42F9C0B-24CB-877D-E4EF-EDBDEC941542}"/>
-              </a:ext>
-            </a:extLst>
-          </p:cNvPr>
-          <p:cNvSpPr txBox="1"/>
-          <p:nvPr/>
-        </p:nvSpPr>
-        <p:spPr>
-          <a:xfrm>
-            <a:off x="10032101" y="392350"/>
-            <a:ext cx="1500539" cy="646331"/>
-          </a:xfrm>
-          <a:prstGeom prst="rect">
-            <a:avLst/>
-          </a:prstGeom>
-          <a:noFill/>
-        </p:spPr>
-        <p:txBody>
-          <a:bodyPr wrap="none" rtlCol="0">
-            <a:spAutoFit/>
-          </a:bodyPr>
-          <a:lstStyle/>
-          <a:p>
-            <a:pPr algn="ctr"/>
-            <a:r>
-              <a:rPr lang="en-US" b="1"/>
-              <a:t>Settings/</a:t>
-            </a:r>
-          </a:p>
-          <a:p>
-            <a:pPr algn="ctr"/>
-            <a:r>
-              <a:rPr lang="en-US" b="1"/>
-              <a:t>Sample data</a:t>
+              <a:t>messages</a:t>
             </a:r>
           </a:p>
         </p:txBody>
@@ -3524,103 +3521,6 @@
             <a:extLst>
               <a:ext uri="{FF2B5EF4-FFF2-40B4-BE49-F238E27FC236}">
                 <a16:creationId xmlns:a16="http://schemas.microsoft.com/office/drawing/2014/main" id="{7F1D104B-3E88-D027-55CD-F6673E9F405D}"/>
-              </a:ext>
-            </a:extLst>
-          </p:cNvPr>
-          <p:cNvCxnSpPr>
-            <a:cxnSpLocks/>
-            <a:stCxn id="7" idx="2"/>
-          </p:cNvCxnSpPr>
-          <p:nvPr/>
-        </p:nvCxnSpPr>
-        <p:spPr>
-          <a:xfrm>
-            <a:off x="2138827" y="1038682"/>
-            <a:ext cx="0" cy="669348"/>
-          </a:xfrm>
-          <a:prstGeom prst="straightConnector1">
-            <a:avLst/>
-          </a:prstGeom>
-          <a:ln w="76200">
-            <a:solidFill>
-              <a:schemeClr val="accent2"/>
-            </a:solidFill>
-            <a:tailEnd type="triangle"/>
-          </a:ln>
-        </p:spPr>
-        <p:style>
-          <a:lnRef idx="2">
-            <a:schemeClr val="accent1"/>
-          </a:lnRef>
-          <a:fillRef idx="0">
-            <a:schemeClr val="accent1"/>
-          </a:fillRef>
-          <a:effectRef idx="1">
-            <a:schemeClr val="accent1"/>
-          </a:effectRef>
-          <a:fontRef idx="minor">
-            <a:schemeClr val="tx1"/>
-          </a:fontRef>
-        </p:style>
-      </p:cxnSp>
-      <p:sp>
-        <p:nvSpPr>
-          <p:cNvPr id="15" name="Rectangle 14">
-            <a:extLst>
-              <a:ext uri="{FF2B5EF4-FFF2-40B4-BE49-F238E27FC236}">
-                <a16:creationId xmlns:a16="http://schemas.microsoft.com/office/drawing/2014/main" id="{538CE5C5-269B-DD1A-93F0-1E15E06AC1DD}"/>
-              </a:ext>
-            </a:extLst>
-          </p:cNvPr>
-          <p:cNvSpPr/>
-          <p:nvPr/>
-        </p:nvSpPr>
-        <p:spPr>
-          <a:xfrm>
-            <a:off x="1535502" y="1708030"/>
-            <a:ext cx="1224951" cy="405442"/>
-          </a:xfrm>
-          <a:prstGeom prst="rect">
-            <a:avLst/>
-          </a:prstGeom>
-          <a:noFill/>
-          <a:ln w="57150">
-            <a:solidFill>
-              <a:schemeClr val="accent2"/>
-            </a:solidFill>
-          </a:ln>
-        </p:spPr>
-        <p:style>
-          <a:lnRef idx="2">
-            <a:schemeClr val="accent1">
-              <a:shade val="15000"/>
-            </a:schemeClr>
-          </a:lnRef>
-          <a:fillRef idx="1">
-            <a:schemeClr val="accent1"/>
-          </a:fillRef>
-          <a:effectRef idx="0">
-            <a:schemeClr val="accent1"/>
-          </a:effectRef>
-          <a:fontRef idx="minor">
-            <a:schemeClr val="lt1"/>
-          </a:fontRef>
-        </p:style>
-        <p:txBody>
-          <a:bodyPr rtlCol="0" anchor="ctr"/>
-          <a:lstStyle/>
-          <a:p>
-            <a:pPr algn="ctr"/>
-            <a:endParaRPr lang="en-US"/>
-          </a:p>
-        </p:txBody>
-      </p:sp>
-      <p:cxnSp>
-        <p:nvCxnSpPr>
-          <p:cNvPr id="16" name="Straight Arrow Connector 15">
-            <a:extLst>
-              <a:ext uri="{FF2B5EF4-FFF2-40B4-BE49-F238E27FC236}">
-                <a16:creationId xmlns:a16="http://schemas.microsoft.com/office/drawing/2014/main" id="{7AE5E757-F375-5291-6EAD-24A1F9AC78C1}"/>
               </a:ext>
             </a:extLst>
           </p:cNvPr>
@@ -3630,58 +3530,14 @@
           <p:nvPr/>
         </p:nvCxnSpPr>
         <p:spPr>
-          <a:xfrm flipH="1">
-            <a:off x="3193077" y="1038682"/>
-            <a:ext cx="642278" cy="1273197"/>
+          <a:xfrm>
+            <a:off x="1443408" y="2673865"/>
+            <a:ext cx="667826" cy="0"/>
           </a:xfrm>
           <a:prstGeom prst="straightConnector1">
             <a:avLst/>
           </a:prstGeom>
-          <a:ln w="76200">
-            <a:solidFill>
-              <a:schemeClr val="accent2"/>
-            </a:solidFill>
-            <a:tailEnd type="triangle"/>
-          </a:ln>
-        </p:spPr>
-        <p:style>
-          <a:lnRef idx="2">
-            <a:schemeClr val="accent1"/>
-          </a:lnRef>
-          <a:fillRef idx="0">
-            <a:schemeClr val="accent1"/>
-          </a:fillRef>
-          <a:effectRef idx="1">
-            <a:schemeClr val="accent1"/>
-          </a:effectRef>
-          <a:fontRef idx="minor">
-            <a:schemeClr val="tx1"/>
-          </a:fontRef>
-        </p:style>
-      </p:cxnSp>
-      <p:cxnSp>
-        <p:nvCxnSpPr>
-          <p:cNvPr id="18" name="Straight Arrow Connector 17">
-            <a:extLst>
-              <a:ext uri="{FF2B5EF4-FFF2-40B4-BE49-F238E27FC236}">
-                <a16:creationId xmlns:a16="http://schemas.microsoft.com/office/drawing/2014/main" id="{88F48D4D-E95A-76AF-CB24-E43FF18E2D00}"/>
-              </a:ext>
-            </a:extLst>
-          </p:cNvPr>
-          <p:cNvCxnSpPr>
-            <a:cxnSpLocks/>
-          </p:cNvCxnSpPr>
-          <p:nvPr/>
-        </p:nvCxnSpPr>
-        <p:spPr>
-          <a:xfrm>
-            <a:off x="4301181" y="1038681"/>
-            <a:ext cx="644421" cy="1273198"/>
-          </a:xfrm>
-          <a:prstGeom prst="straightConnector1">
-            <a:avLst/>
-          </a:prstGeom>
-          <a:ln w="76200">
+          <a:ln w="57150">
             <a:solidFill>
               <a:schemeClr val="accent2"/>
             </a:solidFill>
@@ -3719,8 +3575,8 @@
         </p:nvCxnSpPr>
         <p:spPr>
           <a:xfrm>
-            <a:off x="7791537" y="1038681"/>
-            <a:ext cx="0" cy="1135176"/>
+            <a:off x="8367269" y="1038681"/>
+            <a:ext cx="1" cy="1203292"/>
           </a:xfrm>
           <a:prstGeom prst="straightConnector1">
             <a:avLst/>
@@ -3747,12 +3603,55 @@
           </a:fontRef>
         </p:style>
       </p:cxnSp>
+      <p:sp>
+        <p:nvSpPr>
+          <p:cNvPr id="4" name="TextBox 3">
+            <a:extLst>
+              <a:ext uri="{FF2B5EF4-FFF2-40B4-BE49-F238E27FC236}">
+                <a16:creationId xmlns:a16="http://schemas.microsoft.com/office/drawing/2014/main" id="{E5AE65B7-EF86-E397-6E44-144DF335D314}"/>
+              </a:ext>
+            </a:extLst>
+          </p:cNvPr>
+          <p:cNvSpPr txBox="1"/>
+          <p:nvPr/>
+        </p:nvSpPr>
+        <p:spPr>
+          <a:xfrm>
+            <a:off x="2880445" y="4372709"/>
+            <a:ext cx="1516441" cy="646331"/>
+          </a:xfrm>
+          <a:prstGeom prst="rect">
+            <a:avLst/>
+          </a:prstGeom>
+          <a:noFill/>
+        </p:spPr>
+        <p:txBody>
+          <a:bodyPr wrap="none" rtlCol="0">
+            <a:spAutoFit/>
+          </a:bodyPr>
+          <a:lstStyle/>
+          <a:p>
+            <a:pPr algn="ctr"/>
+            <a:r>
+              <a:rPr lang="en-US" b="1"/>
+              <a:t>Click to view</a:t>
+            </a:r>
+          </a:p>
+          <a:p>
+            <a:pPr algn="ctr"/>
+            <a:r>
+              <a:rPr lang="en-US" b="1"/>
+              <a:t>results</a:t>
+            </a:r>
+          </a:p>
+        </p:txBody>
+      </p:sp>
       <p:cxnSp>
         <p:nvCxnSpPr>
-          <p:cNvPr id="24" name="Straight Arrow Connector 23">
-            <a:extLst>
-              <a:ext uri="{FF2B5EF4-FFF2-40B4-BE49-F238E27FC236}">
-                <a16:creationId xmlns:a16="http://schemas.microsoft.com/office/drawing/2014/main" id="{3F7D70D8-0CC7-93F8-73F8-4679AA18F256}"/>
+          <p:cNvPr id="10" name="Straight Arrow Connector 9">
+            <a:extLst>
+              <a:ext uri="{FF2B5EF4-FFF2-40B4-BE49-F238E27FC236}">
+                <a16:creationId xmlns:a16="http://schemas.microsoft.com/office/drawing/2014/main" id="{0BA8099E-49B3-BDFD-C2E8-2E62635467DF}"/>
               </a:ext>
             </a:extLst>
           </p:cNvPr>
@@ -3763,8 +3662,8 @@
         </p:nvCxnSpPr>
         <p:spPr>
           <a:xfrm>
-            <a:off x="10782370" y="1038681"/>
-            <a:ext cx="0" cy="669349"/>
+            <a:off x="3638666" y="5019040"/>
+            <a:ext cx="0" cy="676887"/>
           </a:xfrm>
           <a:prstGeom prst="straightConnector1">
             <a:avLst/>
@@ -3793,60 +3692,93 @@
       </p:cxnSp>
       <p:sp>
         <p:nvSpPr>
-          <p:cNvPr id="26" name="Rectangle 25">
-            <a:extLst>
-              <a:ext uri="{FF2B5EF4-FFF2-40B4-BE49-F238E27FC236}">
-                <a16:creationId xmlns:a16="http://schemas.microsoft.com/office/drawing/2014/main" id="{20D925C7-EC38-EEFF-E0D2-D8595EC629A4}"/>
-              </a:ext>
-            </a:extLst>
-          </p:cNvPr>
-          <p:cNvSpPr/>
+          <p:cNvPr id="21" name="TextBox 20">
+            <a:extLst>
+              <a:ext uri="{FF2B5EF4-FFF2-40B4-BE49-F238E27FC236}">
+                <a16:creationId xmlns:a16="http://schemas.microsoft.com/office/drawing/2014/main" id="{527CD429-4E9C-2EDE-9474-2E7D7326E012}"/>
+              </a:ext>
+            </a:extLst>
+          </p:cNvPr>
+          <p:cNvSpPr txBox="1"/>
           <p:nvPr/>
         </p:nvSpPr>
         <p:spPr>
           <a:xfrm>
-            <a:off x="10575985" y="1731352"/>
-            <a:ext cx="421728" cy="382120"/>
+            <a:off x="481912" y="1720342"/>
+            <a:ext cx="1939509" cy="738664"/>
           </a:xfrm>
           <a:prstGeom prst="rect">
             <a:avLst/>
           </a:prstGeom>
           <a:noFill/>
+        </p:spPr>
+        <p:txBody>
+          <a:bodyPr wrap="square" rtlCol="0">
+            <a:spAutoFit/>
+          </a:bodyPr>
+          <a:lstStyle/>
+          <a:p>
+            <a:r>
+              <a:rPr lang="en-US" sz="1400" b="1"/>
+              <a:t>Click to return to </a:t>
+            </a:r>
+          </a:p>
+          <a:p>
+            <a:r>
+              <a:rPr lang="en-US" sz="1400" b="1"/>
+              <a:t>the model input screen</a:t>
+            </a:r>
+          </a:p>
+        </p:txBody>
+      </p:sp>
+      <p:cxnSp>
+        <p:nvCxnSpPr>
+          <p:cNvPr id="23" name="Straight Arrow Connector 22">
+            <a:extLst>
+              <a:ext uri="{FF2B5EF4-FFF2-40B4-BE49-F238E27FC236}">
+                <a16:creationId xmlns:a16="http://schemas.microsoft.com/office/drawing/2014/main" id="{9A85BA3A-E3E6-D4A6-B34A-C652731EC4C2}"/>
+              </a:ext>
+            </a:extLst>
+          </p:cNvPr>
+          <p:cNvCxnSpPr>
+            <a:cxnSpLocks/>
+          </p:cNvCxnSpPr>
+          <p:nvPr/>
+        </p:nvCxnSpPr>
+        <p:spPr>
+          <a:xfrm>
+            <a:off x="1443408" y="2320779"/>
+            <a:ext cx="667826" cy="0"/>
+          </a:xfrm>
+          <a:prstGeom prst="straightConnector1">
+            <a:avLst/>
+          </a:prstGeom>
           <a:ln w="57150">
             <a:solidFill>
               <a:schemeClr val="accent2"/>
             </a:solidFill>
+            <a:tailEnd type="triangle"/>
           </a:ln>
         </p:spPr>
         <p:style>
           <a:lnRef idx="2">
-            <a:schemeClr val="accent1">
-              <a:shade val="15000"/>
-            </a:schemeClr>
+            <a:schemeClr val="accent1"/>
           </a:lnRef>
-          <a:fillRef idx="1">
+          <a:fillRef idx="0">
             <a:schemeClr val="accent1"/>
           </a:fillRef>
-          <a:effectRef idx="0">
+          <a:effectRef idx="1">
             <a:schemeClr val="accent1"/>
           </a:effectRef>
           <a:fontRef idx="minor">
-            <a:schemeClr val="lt1"/>
+            <a:schemeClr val="tx1"/>
           </a:fontRef>
         </p:style>
-        <p:txBody>
-          <a:bodyPr rtlCol="0" anchor="ctr"/>
-          <a:lstStyle/>
-          <a:p>
-            <a:pPr algn="ctr"/>
-            <a:endParaRPr lang="en-US"/>
-          </a:p>
-        </p:txBody>
-      </p:sp>
+      </p:cxnSp>
     </p:spTree>
     <p:extLst>
       <p:ext uri="{BB962C8B-B14F-4D97-AF65-F5344CB8AC3E}">
-        <p14:creationId xmlns:p14="http://schemas.microsoft.com/office/powerpoint/2010/main" val="3765661946"/>
+        <p14:creationId xmlns:p14="http://schemas.microsoft.com/office/powerpoint/2010/main" val="166539180"/>
       </p:ext>
     </p:extLst>
   </p:cSld>
@@ -3857,6 +3789,2846 @@
 </file>
 
 <file path=ppt/slides/slide2.xml><?xml version="1.0" encoding="utf-8"?>
+<p:sld xmlns:a="http://schemas.openxmlformats.org/drawingml/2006/main" xmlns:r="http://schemas.openxmlformats.org/officeDocument/2006/relationships" xmlns:p="http://schemas.openxmlformats.org/presentationml/2006/main">
+  <p:cSld>
+    <p:spTree>
+      <p:nvGrpSpPr>
+        <p:cNvPr id="1" name="">
+          <a:extLst>
+            <a:ext uri="{FF2B5EF4-FFF2-40B4-BE49-F238E27FC236}">
+              <a16:creationId xmlns:a16="http://schemas.microsoft.com/office/drawing/2014/main" id="{FF21AA8B-5C00-D825-9356-FAC206167EA9}"/>
+            </a:ext>
+          </a:extLst>
+        </p:cNvPr>
+        <p:cNvGrpSpPr/>
+        <p:nvPr/>
+      </p:nvGrpSpPr>
+      <p:grpSpPr>
+        <a:xfrm>
+          <a:off x="0" y="0"/>
+          <a:ext cx="0" cy="0"/>
+          <a:chOff x="0" y="0"/>
+          <a:chExt cx="0" cy="0"/>
+        </a:xfrm>
+      </p:grpSpPr>
+      <p:pic>
+        <p:nvPicPr>
+          <p:cNvPr id="10" name="Picture 9">
+            <a:extLst>
+              <a:ext uri="{FF2B5EF4-FFF2-40B4-BE49-F238E27FC236}">
+                <a16:creationId xmlns:a16="http://schemas.microsoft.com/office/drawing/2014/main" id="{8152CFCD-9BA0-AEBC-A38B-74BAFD1C3EC0}"/>
+              </a:ext>
+            </a:extLst>
+          </p:cNvPr>
+          <p:cNvPicPr>
+            <a:picLocks noChangeAspect="1"/>
+          </p:cNvPicPr>
+          <p:nvPr/>
+        </p:nvPicPr>
+        <p:blipFill>
+          <a:blip r:embed="rId2"/>
+          <a:stretch>
+            <a:fillRect/>
+          </a:stretch>
+        </p:blipFill>
+        <p:spPr>
+          <a:xfrm>
+            <a:off x="1048084" y="964383"/>
+            <a:ext cx="9769353" cy="5893617"/>
+          </a:xfrm>
+          <a:prstGeom prst="rect">
+            <a:avLst/>
+          </a:prstGeom>
+        </p:spPr>
+      </p:pic>
+      <p:sp>
+        <p:nvSpPr>
+          <p:cNvPr id="6" name="TextBox 5">
+            <a:extLst>
+              <a:ext uri="{FF2B5EF4-FFF2-40B4-BE49-F238E27FC236}">
+                <a16:creationId xmlns:a16="http://schemas.microsoft.com/office/drawing/2014/main" id="{C5340346-B6CF-EC20-A7F7-EF3E26B9C304}"/>
+              </a:ext>
+            </a:extLst>
+          </p:cNvPr>
+          <p:cNvSpPr txBox="1"/>
+          <p:nvPr/>
+        </p:nvSpPr>
+        <p:spPr>
+          <a:xfrm>
+            <a:off x="3213278" y="276999"/>
+            <a:ext cx="1746953" cy="369332"/>
+          </a:xfrm>
+          <a:prstGeom prst="rect">
+            <a:avLst/>
+          </a:prstGeom>
+          <a:noFill/>
+        </p:spPr>
+        <p:txBody>
+          <a:bodyPr wrap="none" rtlCol="0">
+            <a:spAutoFit/>
+          </a:bodyPr>
+          <a:lstStyle/>
+          <a:p>
+            <a:pPr marL="0" marR="0" lvl="0" indent="0" algn="l" defTabSz="914400" rtl="0" eaLnBrk="1" fontAlgn="auto" latinLnBrk="0" hangingPunct="1">
+              <a:lnSpc>
+                <a:spcPct val="100000"/>
+              </a:lnSpc>
+              <a:spcBef>
+                <a:spcPts val="0"/>
+              </a:spcBef>
+              <a:spcAft>
+                <a:spcPts val="0"/>
+              </a:spcAft>
+              <a:buClrTx/>
+              <a:buSzTx/>
+              <a:buFontTx/>
+              <a:buNone/>
+              <a:tabLst/>
+              <a:defRPr/>
+            </a:pPr>
+            <a:r>
+              <a:rPr kumimoji="0" lang="en-US" sz="1800" b="1" i="0" u="none" strike="noStrike" kern="1200" cap="none" spc="0" normalizeH="0" baseline="0" noProof="0">
+                <a:ln>
+                  <a:noFill/>
+                </a:ln>
+                <a:solidFill>
+                  <a:prstClr val="black"/>
+                </a:solidFill>
+                <a:effectLst/>
+                <a:uLnTx/>
+                <a:uFillTx/>
+                <a:latin typeface="Aptos" panose="02110004020202020204"/>
+                <a:ea typeface="+mn-ea"/>
+                <a:cs typeface="+mn-cs"/>
+              </a:rPr>
+              <a:t>InVEST models</a:t>
+            </a:r>
+          </a:p>
+        </p:txBody>
+      </p:sp>
+      <p:sp>
+        <p:nvSpPr>
+          <p:cNvPr id="7" name="TextBox 6">
+            <a:extLst>
+              <a:ext uri="{FF2B5EF4-FFF2-40B4-BE49-F238E27FC236}">
+                <a16:creationId xmlns:a16="http://schemas.microsoft.com/office/drawing/2014/main" id="{AB4F4202-8ED8-A312-EDFE-3FDD2A149430}"/>
+              </a:ext>
+            </a:extLst>
+          </p:cNvPr>
+          <p:cNvSpPr txBox="1"/>
+          <p:nvPr/>
+        </p:nvSpPr>
+        <p:spPr>
+          <a:xfrm>
+            <a:off x="1262267" y="1"/>
+            <a:ext cx="901850" cy="646331"/>
+          </a:xfrm>
+          <a:prstGeom prst="rect">
+            <a:avLst/>
+          </a:prstGeom>
+          <a:noFill/>
+        </p:spPr>
+        <p:txBody>
+          <a:bodyPr wrap="none" rtlCol="0">
+            <a:spAutoFit/>
+          </a:bodyPr>
+          <a:lstStyle/>
+          <a:p>
+            <a:pPr marL="0" marR="0" lvl="0" indent="0" algn="ctr" defTabSz="914400" rtl="0" eaLnBrk="1" fontAlgn="auto" latinLnBrk="0" hangingPunct="1">
+              <a:lnSpc>
+                <a:spcPct val="100000"/>
+              </a:lnSpc>
+              <a:spcBef>
+                <a:spcPts val="0"/>
+              </a:spcBef>
+              <a:spcAft>
+                <a:spcPts val="0"/>
+              </a:spcAft>
+              <a:buClrTx/>
+              <a:buSzTx/>
+              <a:buFontTx/>
+              <a:buNone/>
+              <a:tabLst/>
+              <a:defRPr/>
+            </a:pPr>
+            <a:r>
+              <a:rPr kumimoji="0" lang="en-US" sz="1800" b="1" i="0" u="none" strike="noStrike" kern="1200" cap="none" spc="0" normalizeH="0" baseline="0" noProof="0">
+                <a:ln>
+                  <a:noFill/>
+                </a:ln>
+                <a:solidFill>
+                  <a:prstClr val="black"/>
+                </a:solidFill>
+                <a:effectLst/>
+                <a:uLnTx/>
+                <a:uFillTx/>
+                <a:latin typeface="Aptos" panose="02110004020202020204"/>
+                <a:ea typeface="+mn-ea"/>
+                <a:cs typeface="+mn-cs"/>
+              </a:rPr>
+              <a:t>Home</a:t>
+            </a:r>
+          </a:p>
+          <a:p>
+            <a:pPr marL="0" marR="0" lvl="0" indent="0" algn="ctr" defTabSz="914400" rtl="0" eaLnBrk="1" fontAlgn="auto" latinLnBrk="0" hangingPunct="1">
+              <a:lnSpc>
+                <a:spcPct val="100000"/>
+              </a:lnSpc>
+              <a:spcBef>
+                <a:spcPts val="0"/>
+              </a:spcBef>
+              <a:spcAft>
+                <a:spcPts val="0"/>
+              </a:spcAft>
+              <a:buClrTx/>
+              <a:buSzTx/>
+              <a:buFontTx/>
+              <a:buNone/>
+              <a:tabLst/>
+              <a:defRPr/>
+            </a:pPr>
+            <a:r>
+              <a:rPr kumimoji="0" lang="en-US" sz="1800" b="1" i="0" u="none" strike="noStrike" kern="1200" cap="none" spc="0" normalizeH="0" baseline="0" noProof="0">
+                <a:ln>
+                  <a:noFill/>
+                </a:ln>
+                <a:solidFill>
+                  <a:prstClr val="black"/>
+                </a:solidFill>
+                <a:effectLst/>
+                <a:uLnTx/>
+                <a:uFillTx/>
+                <a:latin typeface="Aptos" panose="02110004020202020204"/>
+                <a:ea typeface="+mn-ea"/>
+                <a:cs typeface="+mn-cs"/>
+              </a:rPr>
+              <a:t>screen</a:t>
+            </a:r>
+          </a:p>
+        </p:txBody>
+      </p:sp>
+      <p:sp>
+        <p:nvSpPr>
+          <p:cNvPr id="8" name="TextBox 7">
+            <a:extLst>
+              <a:ext uri="{FF2B5EF4-FFF2-40B4-BE49-F238E27FC236}">
+                <a16:creationId xmlns:a16="http://schemas.microsoft.com/office/drawing/2014/main" id="{50A8D910-71EC-6144-17C1-795863BA70B9}"/>
+              </a:ext>
+            </a:extLst>
+          </p:cNvPr>
+          <p:cNvSpPr txBox="1"/>
+          <p:nvPr/>
+        </p:nvSpPr>
+        <p:spPr>
+          <a:xfrm>
+            <a:off x="7027229" y="0"/>
+            <a:ext cx="1372492" cy="646331"/>
+          </a:xfrm>
+          <a:prstGeom prst="rect">
+            <a:avLst/>
+          </a:prstGeom>
+          <a:noFill/>
+        </p:spPr>
+        <p:txBody>
+          <a:bodyPr wrap="none" rtlCol="0">
+            <a:spAutoFit/>
+          </a:bodyPr>
+          <a:lstStyle/>
+          <a:p>
+            <a:pPr marL="0" marR="0" lvl="0" indent="0" algn="ctr" defTabSz="914400" rtl="0" eaLnBrk="1" fontAlgn="auto" latinLnBrk="0" hangingPunct="1">
+              <a:lnSpc>
+                <a:spcPct val="100000"/>
+              </a:lnSpc>
+              <a:spcBef>
+                <a:spcPts val="0"/>
+              </a:spcBef>
+              <a:spcAft>
+                <a:spcPts val="0"/>
+              </a:spcAft>
+              <a:buClrTx/>
+              <a:buSzTx/>
+              <a:buFontTx/>
+              <a:buNone/>
+              <a:tabLst/>
+              <a:defRPr/>
+            </a:pPr>
+            <a:r>
+              <a:rPr kumimoji="0" lang="en-US" sz="1800" b="1" i="0" u="none" strike="noStrike" kern="1200" cap="none" spc="0" normalizeH="0" baseline="0" noProof="0">
+                <a:ln>
+                  <a:noFill/>
+                </a:ln>
+                <a:solidFill>
+                  <a:prstClr val="black"/>
+                </a:solidFill>
+                <a:effectLst/>
+                <a:uLnTx/>
+                <a:uFillTx/>
+                <a:latin typeface="Aptos" panose="02110004020202020204"/>
+                <a:ea typeface="+mn-ea"/>
+                <a:cs typeface="+mn-cs"/>
+              </a:rPr>
+              <a:t>Previous </a:t>
+            </a:r>
+          </a:p>
+          <a:p>
+            <a:pPr marL="0" marR="0" lvl="0" indent="0" algn="ctr" defTabSz="914400" rtl="0" eaLnBrk="1" fontAlgn="auto" latinLnBrk="0" hangingPunct="1">
+              <a:lnSpc>
+                <a:spcPct val="100000"/>
+              </a:lnSpc>
+              <a:spcBef>
+                <a:spcPts val="0"/>
+              </a:spcBef>
+              <a:spcAft>
+                <a:spcPts val="0"/>
+              </a:spcAft>
+              <a:buClrTx/>
+              <a:buSzTx/>
+              <a:buFontTx/>
+              <a:buNone/>
+              <a:tabLst/>
+              <a:defRPr/>
+            </a:pPr>
+            <a:r>
+              <a:rPr kumimoji="0" lang="en-US" sz="1800" b="1" i="0" u="none" strike="noStrike" kern="1200" cap="none" spc="0" normalizeH="0" baseline="0" noProof="0">
+                <a:ln>
+                  <a:noFill/>
+                </a:ln>
+                <a:solidFill>
+                  <a:prstClr val="black"/>
+                </a:solidFill>
+                <a:effectLst/>
+                <a:uLnTx/>
+                <a:uFillTx/>
+                <a:latin typeface="Aptos" panose="02110004020202020204"/>
+                <a:ea typeface="+mn-ea"/>
+                <a:cs typeface="+mn-cs"/>
+              </a:rPr>
+              <a:t>model runs</a:t>
+            </a:r>
+          </a:p>
+        </p:txBody>
+      </p:sp>
+      <p:sp>
+        <p:nvSpPr>
+          <p:cNvPr id="9" name="TextBox 8">
+            <a:extLst>
+              <a:ext uri="{FF2B5EF4-FFF2-40B4-BE49-F238E27FC236}">
+                <a16:creationId xmlns:a16="http://schemas.microsoft.com/office/drawing/2014/main" id="{802C1D7E-3C6F-C96E-6B06-9D18A90D9F3A}"/>
+              </a:ext>
+            </a:extLst>
+          </p:cNvPr>
+          <p:cNvSpPr txBox="1"/>
+          <p:nvPr/>
+        </p:nvSpPr>
+        <p:spPr>
+          <a:xfrm>
+            <a:off x="9641012" y="0"/>
+            <a:ext cx="1912703" cy="646331"/>
+          </a:xfrm>
+          <a:prstGeom prst="rect">
+            <a:avLst/>
+          </a:prstGeom>
+          <a:noFill/>
+        </p:spPr>
+        <p:txBody>
+          <a:bodyPr wrap="none" rtlCol="0">
+            <a:spAutoFit/>
+          </a:bodyPr>
+          <a:lstStyle/>
+          <a:p>
+            <a:pPr marL="0" marR="0" lvl="0" indent="0" algn="ctr" defTabSz="914400" rtl="0" eaLnBrk="1" fontAlgn="auto" latinLnBrk="0" hangingPunct="1">
+              <a:lnSpc>
+                <a:spcPct val="100000"/>
+              </a:lnSpc>
+              <a:spcBef>
+                <a:spcPts val="0"/>
+              </a:spcBef>
+              <a:spcAft>
+                <a:spcPts val="0"/>
+              </a:spcAft>
+              <a:buClrTx/>
+              <a:buSzTx/>
+              <a:buFontTx/>
+              <a:buNone/>
+              <a:tabLst/>
+              <a:defRPr/>
+            </a:pPr>
+            <a:r>
+              <a:rPr kumimoji="0" lang="en-US" sz="1800" b="1" i="0" u="none" strike="noStrike" kern="1200" cap="none" spc="0" normalizeH="0" baseline="0" noProof="0">
+                <a:ln>
+                  <a:noFill/>
+                </a:ln>
+                <a:solidFill>
+                  <a:prstClr val="black"/>
+                </a:solidFill>
+                <a:effectLst/>
+                <a:uLnTx/>
+                <a:uFillTx/>
+                <a:latin typeface="Aptos" panose="02110004020202020204"/>
+                <a:ea typeface="+mn-ea"/>
+                <a:cs typeface="+mn-cs"/>
+              </a:rPr>
+              <a:t>Settings/Plugins</a:t>
+            </a:r>
+          </a:p>
+          <a:p>
+            <a:pPr marL="0" marR="0" lvl="0" indent="0" algn="ctr" defTabSz="914400" rtl="0" eaLnBrk="1" fontAlgn="auto" latinLnBrk="0" hangingPunct="1">
+              <a:lnSpc>
+                <a:spcPct val="100000"/>
+              </a:lnSpc>
+              <a:spcBef>
+                <a:spcPts val="0"/>
+              </a:spcBef>
+              <a:spcAft>
+                <a:spcPts val="0"/>
+              </a:spcAft>
+              <a:buClrTx/>
+              <a:buSzTx/>
+              <a:buFontTx/>
+              <a:buNone/>
+              <a:tabLst/>
+              <a:defRPr/>
+            </a:pPr>
+            <a:r>
+              <a:rPr kumimoji="0" lang="en-US" sz="1800" b="1" i="0" u="none" strike="noStrike" kern="1200" cap="none" spc="0" normalizeH="0" baseline="0" noProof="0">
+                <a:ln>
+                  <a:noFill/>
+                </a:ln>
+                <a:solidFill>
+                  <a:prstClr val="black"/>
+                </a:solidFill>
+                <a:effectLst/>
+                <a:uLnTx/>
+                <a:uFillTx/>
+                <a:latin typeface="Aptos" panose="02110004020202020204"/>
+                <a:ea typeface="+mn-ea"/>
+                <a:cs typeface="+mn-cs"/>
+              </a:rPr>
+              <a:t>Sample data</a:t>
+            </a:r>
+          </a:p>
+        </p:txBody>
+      </p:sp>
+      <p:cxnSp>
+        <p:nvCxnSpPr>
+          <p:cNvPr id="11" name="Straight Arrow Connector 10">
+            <a:extLst>
+              <a:ext uri="{FF2B5EF4-FFF2-40B4-BE49-F238E27FC236}">
+                <a16:creationId xmlns:a16="http://schemas.microsoft.com/office/drawing/2014/main" id="{828A3282-8FAB-3B61-85E6-924240664B5C}"/>
+              </a:ext>
+            </a:extLst>
+          </p:cNvPr>
+          <p:cNvCxnSpPr>
+            <a:cxnSpLocks/>
+            <a:stCxn id="7" idx="2"/>
+          </p:cNvCxnSpPr>
+          <p:nvPr/>
+        </p:nvCxnSpPr>
+        <p:spPr>
+          <a:xfrm>
+            <a:off x="1713192" y="646332"/>
+            <a:ext cx="0" cy="669348"/>
+          </a:xfrm>
+          <a:prstGeom prst="straightConnector1">
+            <a:avLst/>
+          </a:prstGeom>
+          <a:ln w="76200">
+            <a:solidFill>
+              <a:schemeClr val="accent2"/>
+            </a:solidFill>
+            <a:tailEnd type="triangle"/>
+          </a:ln>
+        </p:spPr>
+        <p:style>
+          <a:lnRef idx="2">
+            <a:schemeClr val="accent1"/>
+          </a:lnRef>
+          <a:fillRef idx="0">
+            <a:schemeClr val="accent1"/>
+          </a:fillRef>
+          <a:effectRef idx="1">
+            <a:schemeClr val="accent1"/>
+          </a:effectRef>
+          <a:fontRef idx="minor">
+            <a:schemeClr val="tx1"/>
+          </a:fontRef>
+        </p:style>
+      </p:cxnSp>
+      <p:sp>
+        <p:nvSpPr>
+          <p:cNvPr id="15" name="Rectangle 14">
+            <a:extLst>
+              <a:ext uri="{FF2B5EF4-FFF2-40B4-BE49-F238E27FC236}">
+                <a16:creationId xmlns:a16="http://schemas.microsoft.com/office/drawing/2014/main" id="{7BB2941E-3915-F708-90BE-B94CC8241D64}"/>
+              </a:ext>
+            </a:extLst>
+          </p:cNvPr>
+          <p:cNvSpPr/>
+          <p:nvPr/>
+        </p:nvSpPr>
+        <p:spPr>
+          <a:xfrm>
+            <a:off x="1048084" y="1315680"/>
+            <a:ext cx="1253531" cy="405442"/>
+          </a:xfrm>
+          <a:prstGeom prst="rect">
+            <a:avLst/>
+          </a:prstGeom>
+          <a:noFill/>
+          <a:ln w="57150">
+            <a:solidFill>
+              <a:schemeClr val="accent2"/>
+            </a:solidFill>
+          </a:ln>
+        </p:spPr>
+        <p:style>
+          <a:lnRef idx="2">
+            <a:schemeClr val="accent1">
+              <a:shade val="15000"/>
+            </a:schemeClr>
+          </a:lnRef>
+          <a:fillRef idx="1">
+            <a:schemeClr val="accent1"/>
+          </a:fillRef>
+          <a:effectRef idx="0">
+            <a:schemeClr val="accent1"/>
+          </a:effectRef>
+          <a:fontRef idx="minor">
+            <a:schemeClr val="lt1"/>
+          </a:fontRef>
+        </p:style>
+        <p:txBody>
+          <a:bodyPr rtlCol="0" anchor="ctr"/>
+          <a:lstStyle/>
+          <a:p>
+            <a:pPr marL="0" marR="0" lvl="0" indent="0" algn="ctr" defTabSz="914400" rtl="0" eaLnBrk="1" fontAlgn="auto" latinLnBrk="0" hangingPunct="1">
+              <a:lnSpc>
+                <a:spcPct val="100000"/>
+              </a:lnSpc>
+              <a:spcBef>
+                <a:spcPts val="0"/>
+              </a:spcBef>
+              <a:spcAft>
+                <a:spcPts val="0"/>
+              </a:spcAft>
+              <a:buClrTx/>
+              <a:buSzTx/>
+              <a:buFontTx/>
+              <a:buNone/>
+              <a:tabLst/>
+              <a:defRPr/>
+            </a:pPr>
+            <a:endParaRPr kumimoji="0" lang="en-US" sz="1800" b="0" i="0" u="none" strike="noStrike" kern="1200" cap="none" spc="0" normalizeH="0" baseline="0" noProof="0">
+              <a:ln>
+                <a:noFill/>
+              </a:ln>
+              <a:solidFill>
+                <a:prstClr val="white"/>
+              </a:solidFill>
+              <a:effectLst/>
+              <a:uLnTx/>
+              <a:uFillTx/>
+              <a:latin typeface="Aptos" panose="02110004020202020204"/>
+              <a:ea typeface="+mn-ea"/>
+              <a:cs typeface="+mn-cs"/>
+            </a:endParaRPr>
+          </a:p>
+        </p:txBody>
+      </p:sp>
+      <p:cxnSp>
+        <p:nvCxnSpPr>
+          <p:cNvPr id="16" name="Straight Arrow Connector 15">
+            <a:extLst>
+              <a:ext uri="{FF2B5EF4-FFF2-40B4-BE49-F238E27FC236}">
+                <a16:creationId xmlns:a16="http://schemas.microsoft.com/office/drawing/2014/main" id="{BD1F3339-3087-107B-9A39-E951DFD3B186}"/>
+              </a:ext>
+            </a:extLst>
+          </p:cNvPr>
+          <p:cNvCxnSpPr>
+            <a:cxnSpLocks/>
+          </p:cNvCxnSpPr>
+          <p:nvPr/>
+        </p:nvCxnSpPr>
+        <p:spPr>
+          <a:xfrm flipH="1">
+            <a:off x="3207706" y="675349"/>
+            <a:ext cx="642278" cy="1273197"/>
+          </a:xfrm>
+          <a:prstGeom prst="straightConnector1">
+            <a:avLst/>
+          </a:prstGeom>
+          <a:ln w="76200">
+            <a:solidFill>
+              <a:schemeClr val="accent2"/>
+            </a:solidFill>
+            <a:tailEnd type="triangle"/>
+          </a:ln>
+        </p:spPr>
+        <p:style>
+          <a:lnRef idx="2">
+            <a:schemeClr val="accent1"/>
+          </a:lnRef>
+          <a:fillRef idx="0">
+            <a:schemeClr val="accent1"/>
+          </a:fillRef>
+          <a:effectRef idx="1">
+            <a:schemeClr val="accent1"/>
+          </a:effectRef>
+          <a:fontRef idx="minor">
+            <a:schemeClr val="tx1"/>
+          </a:fontRef>
+        </p:style>
+      </p:cxnSp>
+      <p:cxnSp>
+        <p:nvCxnSpPr>
+          <p:cNvPr id="18" name="Straight Arrow Connector 17">
+            <a:extLst>
+              <a:ext uri="{FF2B5EF4-FFF2-40B4-BE49-F238E27FC236}">
+                <a16:creationId xmlns:a16="http://schemas.microsoft.com/office/drawing/2014/main" id="{D3E2ED5B-AD74-CA46-0096-E59133BE22FF}"/>
+              </a:ext>
+            </a:extLst>
+          </p:cNvPr>
+          <p:cNvCxnSpPr>
+            <a:cxnSpLocks/>
+          </p:cNvCxnSpPr>
+          <p:nvPr/>
+        </p:nvCxnSpPr>
+        <p:spPr>
+          <a:xfrm>
+            <a:off x="4315810" y="675348"/>
+            <a:ext cx="644421" cy="1273198"/>
+          </a:xfrm>
+          <a:prstGeom prst="straightConnector1">
+            <a:avLst/>
+          </a:prstGeom>
+          <a:ln w="76200">
+            <a:solidFill>
+              <a:schemeClr val="accent2"/>
+            </a:solidFill>
+            <a:tailEnd type="triangle"/>
+          </a:ln>
+        </p:spPr>
+        <p:style>
+          <a:lnRef idx="2">
+            <a:schemeClr val="accent1"/>
+          </a:lnRef>
+          <a:fillRef idx="0">
+            <a:schemeClr val="accent1"/>
+          </a:fillRef>
+          <a:effectRef idx="1">
+            <a:schemeClr val="accent1"/>
+          </a:effectRef>
+          <a:fontRef idx="minor">
+            <a:schemeClr val="tx1"/>
+          </a:fontRef>
+        </p:style>
+      </p:cxnSp>
+      <p:cxnSp>
+        <p:nvCxnSpPr>
+          <p:cNvPr id="22" name="Straight Arrow Connector 21">
+            <a:extLst>
+              <a:ext uri="{FF2B5EF4-FFF2-40B4-BE49-F238E27FC236}">
+                <a16:creationId xmlns:a16="http://schemas.microsoft.com/office/drawing/2014/main" id="{F84604F4-1548-8784-80FB-B0440832210B}"/>
+              </a:ext>
+            </a:extLst>
+          </p:cNvPr>
+          <p:cNvCxnSpPr>
+            <a:cxnSpLocks/>
+          </p:cNvCxnSpPr>
+          <p:nvPr/>
+        </p:nvCxnSpPr>
+        <p:spPr>
+          <a:xfrm>
+            <a:off x="7713475" y="646331"/>
+            <a:ext cx="0" cy="1135176"/>
+          </a:xfrm>
+          <a:prstGeom prst="straightConnector1">
+            <a:avLst/>
+          </a:prstGeom>
+          <a:ln w="76200">
+            <a:solidFill>
+              <a:schemeClr val="accent2"/>
+            </a:solidFill>
+            <a:tailEnd type="triangle"/>
+          </a:ln>
+        </p:spPr>
+        <p:style>
+          <a:lnRef idx="2">
+            <a:schemeClr val="accent1"/>
+          </a:lnRef>
+          <a:fillRef idx="0">
+            <a:schemeClr val="accent1"/>
+          </a:fillRef>
+          <a:effectRef idx="1">
+            <a:schemeClr val="accent1"/>
+          </a:effectRef>
+          <a:fontRef idx="minor">
+            <a:schemeClr val="tx1"/>
+          </a:fontRef>
+        </p:style>
+      </p:cxnSp>
+      <p:cxnSp>
+        <p:nvCxnSpPr>
+          <p:cNvPr id="24" name="Straight Arrow Connector 23">
+            <a:extLst>
+              <a:ext uri="{FF2B5EF4-FFF2-40B4-BE49-F238E27FC236}">
+                <a16:creationId xmlns:a16="http://schemas.microsoft.com/office/drawing/2014/main" id="{9D4E27E8-38F3-0CF2-BE76-10F1257B75C7}"/>
+              </a:ext>
+            </a:extLst>
+          </p:cNvPr>
+          <p:cNvCxnSpPr>
+            <a:cxnSpLocks/>
+          </p:cNvCxnSpPr>
+          <p:nvPr/>
+        </p:nvCxnSpPr>
+        <p:spPr>
+          <a:xfrm>
+            <a:off x="10597362" y="646331"/>
+            <a:ext cx="0" cy="669349"/>
+          </a:xfrm>
+          <a:prstGeom prst="straightConnector1">
+            <a:avLst/>
+          </a:prstGeom>
+          <a:ln w="76200">
+            <a:solidFill>
+              <a:schemeClr val="accent2"/>
+            </a:solidFill>
+            <a:tailEnd type="triangle"/>
+          </a:ln>
+        </p:spPr>
+        <p:style>
+          <a:lnRef idx="2">
+            <a:schemeClr val="accent1"/>
+          </a:lnRef>
+          <a:fillRef idx="0">
+            <a:schemeClr val="accent1"/>
+          </a:fillRef>
+          <a:effectRef idx="1">
+            <a:schemeClr val="accent1"/>
+          </a:effectRef>
+          <a:fontRef idx="minor">
+            <a:schemeClr val="tx1"/>
+          </a:fontRef>
+        </p:style>
+      </p:cxnSp>
+      <p:sp>
+        <p:nvSpPr>
+          <p:cNvPr id="26" name="Rectangle 25">
+            <a:extLst>
+              <a:ext uri="{FF2B5EF4-FFF2-40B4-BE49-F238E27FC236}">
+                <a16:creationId xmlns:a16="http://schemas.microsoft.com/office/drawing/2014/main" id="{C5002D3D-2C35-6934-82FA-DE83F0595DEB}"/>
+              </a:ext>
+            </a:extLst>
+          </p:cNvPr>
+          <p:cNvSpPr/>
+          <p:nvPr/>
+        </p:nvSpPr>
+        <p:spPr>
+          <a:xfrm>
+            <a:off x="10374936" y="1328308"/>
+            <a:ext cx="421728" cy="392814"/>
+          </a:xfrm>
+          <a:prstGeom prst="rect">
+            <a:avLst/>
+          </a:prstGeom>
+          <a:noFill/>
+          <a:ln w="57150">
+            <a:solidFill>
+              <a:schemeClr val="accent2"/>
+            </a:solidFill>
+          </a:ln>
+        </p:spPr>
+        <p:style>
+          <a:lnRef idx="2">
+            <a:schemeClr val="accent1">
+              <a:shade val="15000"/>
+            </a:schemeClr>
+          </a:lnRef>
+          <a:fillRef idx="1">
+            <a:schemeClr val="accent1"/>
+          </a:fillRef>
+          <a:effectRef idx="0">
+            <a:schemeClr val="accent1"/>
+          </a:effectRef>
+          <a:fontRef idx="minor">
+            <a:schemeClr val="lt1"/>
+          </a:fontRef>
+        </p:style>
+        <p:txBody>
+          <a:bodyPr rtlCol="0" anchor="ctr"/>
+          <a:lstStyle/>
+          <a:p>
+            <a:pPr marL="0" marR="0" lvl="0" indent="0" algn="ctr" defTabSz="914400" rtl="0" eaLnBrk="1" fontAlgn="auto" latinLnBrk="0" hangingPunct="1">
+              <a:lnSpc>
+                <a:spcPct val="100000"/>
+              </a:lnSpc>
+              <a:spcBef>
+                <a:spcPts val="0"/>
+              </a:spcBef>
+              <a:spcAft>
+                <a:spcPts val="0"/>
+              </a:spcAft>
+              <a:buClrTx/>
+              <a:buSzTx/>
+              <a:buFontTx/>
+              <a:buNone/>
+              <a:tabLst/>
+              <a:defRPr/>
+            </a:pPr>
+            <a:endParaRPr kumimoji="0" lang="en-US" sz="1800" b="0" i="0" u="none" strike="noStrike" kern="1200" cap="none" spc="0" normalizeH="0" baseline="0" noProof="0">
+              <a:ln>
+                <a:noFill/>
+              </a:ln>
+              <a:solidFill>
+                <a:prstClr val="white"/>
+              </a:solidFill>
+              <a:effectLst/>
+              <a:uLnTx/>
+              <a:uFillTx/>
+              <a:latin typeface="Aptos" panose="02110004020202020204"/>
+              <a:ea typeface="+mn-ea"/>
+              <a:cs typeface="+mn-cs"/>
+            </a:endParaRPr>
+          </a:p>
+        </p:txBody>
+      </p:sp>
+    </p:spTree>
+    <p:extLst>
+      <p:ext uri="{BB962C8B-B14F-4D97-AF65-F5344CB8AC3E}">
+        <p14:creationId xmlns:p14="http://schemas.microsoft.com/office/powerpoint/2010/main" val="2321712748"/>
+      </p:ext>
+    </p:extLst>
+  </p:cSld>
+  <p:clrMapOvr>
+    <a:masterClrMapping/>
+  </p:clrMapOvr>
+</p:sld>
+</file>
+
+<file path=ppt/slides/slide3.xml><?xml version="1.0" encoding="utf-8"?>
+<p:sld xmlns:a="http://schemas.openxmlformats.org/drawingml/2006/main" xmlns:r="http://schemas.openxmlformats.org/officeDocument/2006/relationships" xmlns:p="http://schemas.openxmlformats.org/presentationml/2006/main">
+  <p:cSld>
+    <p:spTree>
+      <p:nvGrpSpPr>
+        <p:cNvPr id="1" name="">
+          <a:extLst>
+            <a:ext uri="{FF2B5EF4-FFF2-40B4-BE49-F238E27FC236}">
+              <a16:creationId xmlns:a16="http://schemas.microsoft.com/office/drawing/2014/main" id="{E7ACB7A9-6B21-A7D4-2A0E-7FF3C21996B3}"/>
+            </a:ext>
+          </a:extLst>
+        </p:cNvPr>
+        <p:cNvGrpSpPr/>
+        <p:nvPr/>
+      </p:nvGrpSpPr>
+      <p:grpSpPr>
+        <a:xfrm>
+          <a:off x="0" y="0"/>
+          <a:ext cx="0" cy="0"/>
+          <a:chOff x="0" y="0"/>
+          <a:chExt cx="0" cy="0"/>
+        </a:xfrm>
+      </p:grpSpPr>
+      <p:pic>
+        <p:nvPicPr>
+          <p:cNvPr id="10" name="Picture 9">
+            <a:extLst>
+              <a:ext uri="{FF2B5EF4-FFF2-40B4-BE49-F238E27FC236}">
+                <a16:creationId xmlns:a16="http://schemas.microsoft.com/office/drawing/2014/main" id="{D95C2659-98C8-2FBE-4358-99A0B3DDF9B9}"/>
+              </a:ext>
+            </a:extLst>
+          </p:cNvPr>
+          <p:cNvPicPr>
+            <a:picLocks noChangeAspect="1"/>
+          </p:cNvPicPr>
+          <p:nvPr/>
+        </p:nvPicPr>
+        <p:blipFill>
+          <a:blip r:embed="rId2"/>
+          <a:stretch>
+            <a:fillRect/>
+          </a:stretch>
+        </p:blipFill>
+        <p:spPr>
+          <a:xfrm>
+            <a:off x="1048084" y="964383"/>
+            <a:ext cx="9769353" cy="5893617"/>
+          </a:xfrm>
+          <a:prstGeom prst="rect">
+            <a:avLst/>
+          </a:prstGeom>
+        </p:spPr>
+      </p:pic>
+      <p:sp>
+        <p:nvSpPr>
+          <p:cNvPr id="9" name="TextBox 8">
+            <a:extLst>
+              <a:ext uri="{FF2B5EF4-FFF2-40B4-BE49-F238E27FC236}">
+                <a16:creationId xmlns:a16="http://schemas.microsoft.com/office/drawing/2014/main" id="{D2CB6320-384B-B21C-AF63-1C6456E24561}"/>
+              </a:ext>
+            </a:extLst>
+          </p:cNvPr>
+          <p:cNvSpPr txBox="1"/>
+          <p:nvPr/>
+        </p:nvSpPr>
+        <p:spPr>
+          <a:xfrm>
+            <a:off x="9641012" y="0"/>
+            <a:ext cx="1912703" cy="646331"/>
+          </a:xfrm>
+          <a:prstGeom prst="rect">
+            <a:avLst/>
+          </a:prstGeom>
+          <a:noFill/>
+        </p:spPr>
+        <p:txBody>
+          <a:bodyPr wrap="none" rtlCol="0">
+            <a:spAutoFit/>
+          </a:bodyPr>
+          <a:lstStyle/>
+          <a:p>
+            <a:pPr marL="0" marR="0" lvl="0" indent="0" algn="ctr" defTabSz="914400" rtl="0" eaLnBrk="1" fontAlgn="auto" latinLnBrk="0" hangingPunct="1">
+              <a:lnSpc>
+                <a:spcPct val="100000"/>
+              </a:lnSpc>
+              <a:spcBef>
+                <a:spcPts val="0"/>
+              </a:spcBef>
+              <a:spcAft>
+                <a:spcPts val="0"/>
+              </a:spcAft>
+              <a:buClrTx/>
+              <a:buSzTx/>
+              <a:buFontTx/>
+              <a:buNone/>
+              <a:tabLst/>
+              <a:defRPr/>
+            </a:pPr>
+            <a:r>
+              <a:rPr kumimoji="0" lang="en-US" sz="1800" b="1" i="0" u="none" strike="noStrike" kern="1200" cap="none" spc="0" normalizeH="0" baseline="0" noProof="0">
+                <a:ln>
+                  <a:noFill/>
+                </a:ln>
+                <a:solidFill>
+                  <a:prstClr val="black"/>
+                </a:solidFill>
+                <a:effectLst/>
+                <a:uLnTx/>
+                <a:uFillTx/>
+                <a:latin typeface="Aptos" panose="02110004020202020204"/>
+                <a:ea typeface="+mn-ea"/>
+                <a:cs typeface="+mn-cs"/>
+              </a:rPr>
+              <a:t>Settings/Plugins</a:t>
+            </a:r>
+          </a:p>
+          <a:p>
+            <a:pPr marL="0" marR="0" lvl="0" indent="0" algn="ctr" defTabSz="914400" rtl="0" eaLnBrk="1" fontAlgn="auto" latinLnBrk="0" hangingPunct="1">
+              <a:lnSpc>
+                <a:spcPct val="100000"/>
+              </a:lnSpc>
+              <a:spcBef>
+                <a:spcPts val="0"/>
+              </a:spcBef>
+              <a:spcAft>
+                <a:spcPts val="0"/>
+              </a:spcAft>
+              <a:buClrTx/>
+              <a:buSzTx/>
+              <a:buFontTx/>
+              <a:buNone/>
+              <a:tabLst/>
+              <a:defRPr/>
+            </a:pPr>
+            <a:r>
+              <a:rPr kumimoji="0" lang="en-US" sz="1800" b="1" i="0" u="none" strike="noStrike" kern="1200" cap="none" spc="0" normalizeH="0" baseline="0" noProof="0">
+                <a:ln>
+                  <a:noFill/>
+                </a:ln>
+                <a:solidFill>
+                  <a:prstClr val="black"/>
+                </a:solidFill>
+                <a:effectLst/>
+                <a:uLnTx/>
+                <a:uFillTx/>
+                <a:latin typeface="Aptos" panose="02110004020202020204"/>
+                <a:ea typeface="+mn-ea"/>
+                <a:cs typeface="+mn-cs"/>
+              </a:rPr>
+              <a:t>Sample data</a:t>
+            </a:r>
+          </a:p>
+        </p:txBody>
+      </p:sp>
+      <p:cxnSp>
+        <p:nvCxnSpPr>
+          <p:cNvPr id="24" name="Straight Arrow Connector 23">
+            <a:extLst>
+              <a:ext uri="{FF2B5EF4-FFF2-40B4-BE49-F238E27FC236}">
+                <a16:creationId xmlns:a16="http://schemas.microsoft.com/office/drawing/2014/main" id="{3A6B52B0-1F30-D015-00DF-7BD33FD76B3C}"/>
+              </a:ext>
+            </a:extLst>
+          </p:cNvPr>
+          <p:cNvCxnSpPr>
+            <a:cxnSpLocks/>
+          </p:cNvCxnSpPr>
+          <p:nvPr/>
+        </p:nvCxnSpPr>
+        <p:spPr>
+          <a:xfrm>
+            <a:off x="10597362" y="646331"/>
+            <a:ext cx="0" cy="669349"/>
+          </a:xfrm>
+          <a:prstGeom prst="straightConnector1">
+            <a:avLst/>
+          </a:prstGeom>
+          <a:ln w="76200">
+            <a:solidFill>
+              <a:schemeClr val="accent2"/>
+            </a:solidFill>
+            <a:tailEnd type="triangle"/>
+          </a:ln>
+        </p:spPr>
+        <p:style>
+          <a:lnRef idx="2">
+            <a:schemeClr val="accent1"/>
+          </a:lnRef>
+          <a:fillRef idx="0">
+            <a:schemeClr val="accent1"/>
+          </a:fillRef>
+          <a:effectRef idx="1">
+            <a:schemeClr val="accent1"/>
+          </a:effectRef>
+          <a:fontRef idx="minor">
+            <a:schemeClr val="tx1"/>
+          </a:fontRef>
+        </p:style>
+      </p:cxnSp>
+      <p:sp>
+        <p:nvSpPr>
+          <p:cNvPr id="26" name="Rectangle 25">
+            <a:extLst>
+              <a:ext uri="{FF2B5EF4-FFF2-40B4-BE49-F238E27FC236}">
+                <a16:creationId xmlns:a16="http://schemas.microsoft.com/office/drawing/2014/main" id="{B29607C7-B0D7-539B-1189-03DAEAC36250}"/>
+              </a:ext>
+            </a:extLst>
+          </p:cNvPr>
+          <p:cNvSpPr/>
+          <p:nvPr/>
+        </p:nvSpPr>
+        <p:spPr>
+          <a:xfrm>
+            <a:off x="10374936" y="1328308"/>
+            <a:ext cx="421728" cy="392814"/>
+          </a:xfrm>
+          <a:prstGeom prst="rect">
+            <a:avLst/>
+          </a:prstGeom>
+          <a:noFill/>
+          <a:ln w="57150">
+            <a:solidFill>
+              <a:schemeClr val="accent2"/>
+            </a:solidFill>
+          </a:ln>
+        </p:spPr>
+        <p:style>
+          <a:lnRef idx="2">
+            <a:schemeClr val="accent1">
+              <a:shade val="15000"/>
+            </a:schemeClr>
+          </a:lnRef>
+          <a:fillRef idx="1">
+            <a:schemeClr val="accent1"/>
+          </a:fillRef>
+          <a:effectRef idx="0">
+            <a:schemeClr val="accent1"/>
+          </a:effectRef>
+          <a:fontRef idx="minor">
+            <a:schemeClr val="lt1"/>
+          </a:fontRef>
+        </p:style>
+        <p:txBody>
+          <a:bodyPr rtlCol="0" anchor="ctr"/>
+          <a:lstStyle/>
+          <a:p>
+            <a:pPr marL="0" marR="0" lvl="0" indent="0" algn="ctr" defTabSz="914400" rtl="0" eaLnBrk="1" fontAlgn="auto" latinLnBrk="0" hangingPunct="1">
+              <a:lnSpc>
+                <a:spcPct val="100000"/>
+              </a:lnSpc>
+              <a:spcBef>
+                <a:spcPts val="0"/>
+              </a:spcBef>
+              <a:spcAft>
+                <a:spcPts val="0"/>
+              </a:spcAft>
+              <a:buClrTx/>
+              <a:buSzTx/>
+              <a:buFontTx/>
+              <a:buNone/>
+              <a:tabLst/>
+              <a:defRPr/>
+            </a:pPr>
+            <a:endParaRPr kumimoji="0" lang="en-US" sz="1800" b="0" i="0" u="none" strike="noStrike" kern="1200" cap="none" spc="0" normalizeH="0" baseline="0" noProof="0">
+              <a:ln>
+                <a:noFill/>
+              </a:ln>
+              <a:solidFill>
+                <a:prstClr val="white"/>
+              </a:solidFill>
+              <a:effectLst/>
+              <a:uLnTx/>
+              <a:uFillTx/>
+              <a:latin typeface="Aptos" panose="02110004020202020204"/>
+              <a:ea typeface="+mn-ea"/>
+              <a:cs typeface="+mn-cs"/>
+            </a:endParaRPr>
+          </a:p>
+        </p:txBody>
+      </p:sp>
+    </p:spTree>
+    <p:extLst>
+      <p:ext uri="{BB962C8B-B14F-4D97-AF65-F5344CB8AC3E}">
+        <p14:creationId xmlns:p14="http://schemas.microsoft.com/office/powerpoint/2010/main" val="1315418085"/>
+      </p:ext>
+    </p:extLst>
+  </p:cSld>
+  <p:clrMapOvr>
+    <a:masterClrMapping/>
+  </p:clrMapOvr>
+</p:sld>
+</file>
+
+<file path=ppt/slides/slide4.xml><?xml version="1.0" encoding="utf-8"?>
+<p:sld xmlns:a="http://schemas.openxmlformats.org/drawingml/2006/main" xmlns:r="http://schemas.openxmlformats.org/officeDocument/2006/relationships" xmlns:p="http://schemas.openxmlformats.org/presentationml/2006/main">
+  <p:cSld>
+    <p:spTree>
+      <p:nvGrpSpPr>
+        <p:cNvPr id="1" name="">
+          <a:extLst>
+            <a:ext uri="{FF2B5EF4-FFF2-40B4-BE49-F238E27FC236}">
+              <a16:creationId xmlns:a16="http://schemas.microsoft.com/office/drawing/2014/main" id="{716C3771-FBD8-3B0F-FF0B-87F265A3EA5B}"/>
+            </a:ext>
+          </a:extLst>
+        </p:cNvPr>
+        <p:cNvGrpSpPr/>
+        <p:nvPr/>
+      </p:nvGrpSpPr>
+      <p:grpSpPr>
+        <a:xfrm>
+          <a:off x="0" y="0"/>
+          <a:ext cx="0" cy="0"/>
+          <a:chOff x="0" y="0"/>
+          <a:chExt cx="0" cy="0"/>
+        </a:xfrm>
+      </p:grpSpPr>
+      <p:pic>
+        <p:nvPicPr>
+          <p:cNvPr id="4" name="Picture 3">
+            <a:extLst>
+              <a:ext uri="{FF2B5EF4-FFF2-40B4-BE49-F238E27FC236}">
+                <a16:creationId xmlns:a16="http://schemas.microsoft.com/office/drawing/2014/main" id="{6C919AF2-CCCE-52B2-35E8-69B598ADC2B7}"/>
+              </a:ext>
+            </a:extLst>
+          </p:cNvPr>
+          <p:cNvPicPr>
+            <a:picLocks noChangeAspect="1"/>
+          </p:cNvPicPr>
+          <p:nvPr/>
+        </p:nvPicPr>
+        <p:blipFill>
+          <a:blip r:embed="rId2"/>
+          <a:stretch>
+            <a:fillRect/>
+          </a:stretch>
+        </p:blipFill>
+        <p:spPr>
+          <a:xfrm>
+            <a:off x="2538393" y="1282780"/>
+            <a:ext cx="9241572" cy="5575219"/>
+          </a:xfrm>
+          <a:prstGeom prst="rect">
+            <a:avLst/>
+          </a:prstGeom>
+        </p:spPr>
+      </p:pic>
+      <p:sp>
+        <p:nvSpPr>
+          <p:cNvPr id="7" name="TextBox 6">
+            <a:extLst>
+              <a:ext uri="{FF2B5EF4-FFF2-40B4-BE49-F238E27FC236}">
+                <a16:creationId xmlns:a16="http://schemas.microsoft.com/office/drawing/2014/main" id="{417564C8-9A44-9B89-6C7E-234FEAA03322}"/>
+              </a:ext>
+            </a:extLst>
+          </p:cNvPr>
+          <p:cNvSpPr txBox="1"/>
+          <p:nvPr/>
+        </p:nvSpPr>
+        <p:spPr>
+          <a:xfrm>
+            <a:off x="2963435" y="4960970"/>
+            <a:ext cx="1388970" cy="646331"/>
+          </a:xfrm>
+          <a:prstGeom prst="rect">
+            <a:avLst/>
+          </a:prstGeom>
+          <a:noFill/>
+        </p:spPr>
+        <p:txBody>
+          <a:bodyPr wrap="none" rtlCol="0">
+            <a:spAutoFit/>
+          </a:bodyPr>
+          <a:lstStyle/>
+          <a:p>
+            <a:pPr marL="0" marR="0" lvl="0" indent="0" algn="ctr" defTabSz="914400" rtl="0" eaLnBrk="1" fontAlgn="auto" latinLnBrk="0" hangingPunct="1">
+              <a:lnSpc>
+                <a:spcPct val="100000"/>
+              </a:lnSpc>
+              <a:spcBef>
+                <a:spcPts val="0"/>
+              </a:spcBef>
+              <a:spcAft>
+                <a:spcPts val="0"/>
+              </a:spcAft>
+              <a:buClrTx/>
+              <a:buSzTx/>
+              <a:buFontTx/>
+              <a:buNone/>
+              <a:tabLst/>
+              <a:defRPr/>
+            </a:pPr>
+            <a:r>
+              <a:rPr kumimoji="0" lang="en-US" sz="1800" b="1" i="0" u="none" strike="noStrike" kern="1200" cap="none" spc="0" normalizeH="0" baseline="0" noProof="0">
+                <a:ln>
+                  <a:noFill/>
+                </a:ln>
+                <a:solidFill>
+                  <a:prstClr val="black"/>
+                </a:solidFill>
+                <a:effectLst/>
+                <a:uLnTx/>
+                <a:uFillTx/>
+                <a:latin typeface="Aptos" panose="02110004020202020204"/>
+                <a:ea typeface="+mn-ea"/>
+                <a:cs typeface="+mn-cs"/>
+              </a:rPr>
+              <a:t>Click to run</a:t>
+            </a:r>
+          </a:p>
+          <a:p>
+            <a:pPr marL="0" marR="0" lvl="0" indent="0" algn="ctr" defTabSz="914400" rtl="0" eaLnBrk="1" fontAlgn="auto" latinLnBrk="0" hangingPunct="1">
+              <a:lnSpc>
+                <a:spcPct val="100000"/>
+              </a:lnSpc>
+              <a:spcBef>
+                <a:spcPts val="0"/>
+              </a:spcBef>
+              <a:spcAft>
+                <a:spcPts val="0"/>
+              </a:spcAft>
+              <a:buClrTx/>
+              <a:buSzTx/>
+              <a:buFontTx/>
+              <a:buNone/>
+              <a:tabLst/>
+              <a:defRPr/>
+            </a:pPr>
+            <a:r>
+              <a:rPr kumimoji="0" lang="en-US" sz="1800" b="1" i="0" u="none" strike="noStrike" kern="1200" cap="none" spc="0" normalizeH="0" baseline="0" noProof="0">
+                <a:ln>
+                  <a:noFill/>
+                </a:ln>
+                <a:solidFill>
+                  <a:prstClr val="black"/>
+                </a:solidFill>
+                <a:effectLst/>
+                <a:uLnTx/>
+                <a:uFillTx/>
+                <a:latin typeface="Aptos" panose="02110004020202020204"/>
+                <a:ea typeface="+mn-ea"/>
+                <a:cs typeface="+mn-cs"/>
+              </a:rPr>
+              <a:t>the model</a:t>
+            </a:r>
+          </a:p>
+        </p:txBody>
+      </p:sp>
+      <p:sp>
+        <p:nvSpPr>
+          <p:cNvPr id="8" name="TextBox 7">
+            <a:extLst>
+              <a:ext uri="{FF2B5EF4-FFF2-40B4-BE49-F238E27FC236}">
+                <a16:creationId xmlns:a16="http://schemas.microsoft.com/office/drawing/2014/main" id="{A05D1319-45CB-B3FF-A4BD-607A309BA3BB}"/>
+              </a:ext>
+            </a:extLst>
+          </p:cNvPr>
+          <p:cNvSpPr txBox="1"/>
+          <p:nvPr/>
+        </p:nvSpPr>
+        <p:spPr>
+          <a:xfrm>
+            <a:off x="9342180" y="392350"/>
+            <a:ext cx="849592" cy="646331"/>
+          </a:xfrm>
+          <a:prstGeom prst="rect">
+            <a:avLst/>
+          </a:prstGeom>
+          <a:noFill/>
+        </p:spPr>
+        <p:txBody>
+          <a:bodyPr wrap="none" rtlCol="0">
+            <a:spAutoFit/>
+          </a:bodyPr>
+          <a:lstStyle/>
+          <a:p>
+            <a:pPr marL="0" marR="0" lvl="0" indent="0" algn="ctr" defTabSz="914400" rtl="0" eaLnBrk="1" fontAlgn="auto" latinLnBrk="0" hangingPunct="1">
+              <a:lnSpc>
+                <a:spcPct val="100000"/>
+              </a:lnSpc>
+              <a:spcBef>
+                <a:spcPts val="0"/>
+              </a:spcBef>
+              <a:spcAft>
+                <a:spcPts val="0"/>
+              </a:spcAft>
+              <a:buClrTx/>
+              <a:buSzTx/>
+              <a:buFontTx/>
+              <a:buNone/>
+              <a:tabLst/>
+              <a:defRPr/>
+            </a:pPr>
+            <a:r>
+              <a:rPr kumimoji="0" lang="en-US" sz="1800" b="1" i="0" u="none" strike="noStrike" kern="1200" cap="none" spc="0" normalizeH="0" baseline="0" noProof="0">
+                <a:ln>
+                  <a:noFill/>
+                </a:ln>
+                <a:solidFill>
+                  <a:prstClr val="black"/>
+                </a:solidFill>
+                <a:effectLst/>
+                <a:uLnTx/>
+                <a:uFillTx/>
+                <a:latin typeface="Aptos" panose="02110004020202020204"/>
+                <a:ea typeface="+mn-ea"/>
+                <a:cs typeface="+mn-cs"/>
+              </a:rPr>
+              <a:t>Model</a:t>
+            </a:r>
+          </a:p>
+          <a:p>
+            <a:pPr marL="0" marR="0" lvl="0" indent="0" algn="ctr" defTabSz="914400" rtl="0" eaLnBrk="1" fontAlgn="auto" latinLnBrk="0" hangingPunct="1">
+              <a:lnSpc>
+                <a:spcPct val="100000"/>
+              </a:lnSpc>
+              <a:spcBef>
+                <a:spcPts val="0"/>
+              </a:spcBef>
+              <a:spcAft>
+                <a:spcPts val="0"/>
+              </a:spcAft>
+              <a:buClrTx/>
+              <a:buSzTx/>
+              <a:buFontTx/>
+              <a:buNone/>
+              <a:tabLst/>
+              <a:defRPr/>
+            </a:pPr>
+            <a:r>
+              <a:rPr kumimoji="0" lang="en-US" sz="1800" b="1" i="0" u="none" strike="noStrike" kern="1200" cap="none" spc="0" normalizeH="0" baseline="0" noProof="0">
+                <a:ln>
+                  <a:noFill/>
+                </a:ln>
+                <a:solidFill>
+                  <a:prstClr val="black"/>
+                </a:solidFill>
+                <a:effectLst/>
+                <a:uLnTx/>
+                <a:uFillTx/>
+                <a:latin typeface="Aptos" panose="02110004020202020204"/>
+                <a:ea typeface="+mn-ea"/>
+                <a:cs typeface="+mn-cs"/>
+              </a:rPr>
+              <a:t>inputs</a:t>
+            </a:r>
+          </a:p>
+        </p:txBody>
+      </p:sp>
+      <p:cxnSp>
+        <p:nvCxnSpPr>
+          <p:cNvPr id="11" name="Straight Arrow Connector 10">
+            <a:extLst>
+              <a:ext uri="{FF2B5EF4-FFF2-40B4-BE49-F238E27FC236}">
+                <a16:creationId xmlns:a16="http://schemas.microsoft.com/office/drawing/2014/main" id="{F69F48AB-B667-8493-C8D8-6897D619845A}"/>
+              </a:ext>
+            </a:extLst>
+          </p:cNvPr>
+          <p:cNvCxnSpPr>
+            <a:cxnSpLocks/>
+            <a:stCxn id="7" idx="2"/>
+          </p:cNvCxnSpPr>
+          <p:nvPr/>
+        </p:nvCxnSpPr>
+        <p:spPr>
+          <a:xfrm flipH="1">
+            <a:off x="3657917" y="5607301"/>
+            <a:ext cx="3" cy="669348"/>
+          </a:xfrm>
+          <a:prstGeom prst="straightConnector1">
+            <a:avLst/>
+          </a:prstGeom>
+          <a:ln w="76200">
+            <a:solidFill>
+              <a:schemeClr val="accent2"/>
+            </a:solidFill>
+            <a:tailEnd type="triangle"/>
+          </a:ln>
+        </p:spPr>
+        <p:style>
+          <a:lnRef idx="2">
+            <a:schemeClr val="accent1"/>
+          </a:lnRef>
+          <a:fillRef idx="0">
+            <a:schemeClr val="accent1"/>
+          </a:fillRef>
+          <a:effectRef idx="1">
+            <a:schemeClr val="accent1"/>
+          </a:effectRef>
+          <a:fontRef idx="minor">
+            <a:schemeClr val="tx1"/>
+          </a:fontRef>
+        </p:style>
+      </p:cxnSp>
+      <p:cxnSp>
+        <p:nvCxnSpPr>
+          <p:cNvPr id="22" name="Straight Arrow Connector 21">
+            <a:extLst>
+              <a:ext uri="{FF2B5EF4-FFF2-40B4-BE49-F238E27FC236}">
+                <a16:creationId xmlns:a16="http://schemas.microsoft.com/office/drawing/2014/main" id="{AABBF2CC-73F7-4689-982B-D6A800039394}"/>
+              </a:ext>
+            </a:extLst>
+          </p:cNvPr>
+          <p:cNvCxnSpPr>
+            <a:cxnSpLocks/>
+          </p:cNvCxnSpPr>
+          <p:nvPr/>
+        </p:nvCxnSpPr>
+        <p:spPr>
+          <a:xfrm>
+            <a:off x="9766975" y="1121434"/>
+            <a:ext cx="0" cy="855711"/>
+          </a:xfrm>
+          <a:prstGeom prst="straightConnector1">
+            <a:avLst/>
+          </a:prstGeom>
+          <a:ln w="76200">
+            <a:solidFill>
+              <a:schemeClr val="accent2"/>
+            </a:solidFill>
+            <a:tailEnd type="triangle"/>
+          </a:ln>
+        </p:spPr>
+        <p:style>
+          <a:lnRef idx="2">
+            <a:schemeClr val="accent1"/>
+          </a:lnRef>
+          <a:fillRef idx="0">
+            <a:schemeClr val="accent1"/>
+          </a:fillRef>
+          <a:effectRef idx="1">
+            <a:schemeClr val="accent1"/>
+          </a:effectRef>
+          <a:fontRef idx="minor">
+            <a:schemeClr val="tx1"/>
+          </a:fontRef>
+        </p:style>
+      </p:cxnSp>
+      <p:sp>
+        <p:nvSpPr>
+          <p:cNvPr id="10" name="TextBox 9">
+            <a:extLst>
+              <a:ext uri="{FF2B5EF4-FFF2-40B4-BE49-F238E27FC236}">
+                <a16:creationId xmlns:a16="http://schemas.microsoft.com/office/drawing/2014/main" id="{D19F6B32-B5AC-DD39-5F5D-D88242674D7E}"/>
+              </a:ext>
+            </a:extLst>
+          </p:cNvPr>
+          <p:cNvSpPr txBox="1"/>
+          <p:nvPr/>
+        </p:nvSpPr>
+        <p:spPr>
+          <a:xfrm>
+            <a:off x="6011099" y="392350"/>
+            <a:ext cx="1935209" cy="646331"/>
+          </a:xfrm>
+          <a:prstGeom prst="rect">
+            <a:avLst/>
+          </a:prstGeom>
+          <a:noFill/>
+        </p:spPr>
+        <p:txBody>
+          <a:bodyPr wrap="none" rtlCol="0">
+            <a:spAutoFit/>
+          </a:bodyPr>
+          <a:lstStyle/>
+          <a:p>
+            <a:pPr marL="0" marR="0" lvl="0" indent="0" algn="ctr" defTabSz="914400" rtl="0" eaLnBrk="1" fontAlgn="auto" latinLnBrk="0" hangingPunct="1">
+              <a:lnSpc>
+                <a:spcPct val="100000"/>
+              </a:lnSpc>
+              <a:spcBef>
+                <a:spcPts val="0"/>
+              </a:spcBef>
+              <a:spcAft>
+                <a:spcPts val="0"/>
+              </a:spcAft>
+              <a:buClrTx/>
+              <a:buSzTx/>
+              <a:buFontTx/>
+              <a:buNone/>
+              <a:tabLst/>
+              <a:defRPr/>
+            </a:pPr>
+            <a:r>
+              <a:rPr kumimoji="0" lang="en-US" sz="1800" b="1" i="0" u="none" strike="noStrike" kern="1200" cap="none" spc="0" normalizeH="0" baseline="0" noProof="0">
+                <a:ln>
+                  <a:noFill/>
+                </a:ln>
+                <a:solidFill>
+                  <a:prstClr val="black"/>
+                </a:solidFill>
+                <a:effectLst/>
+                <a:uLnTx/>
+                <a:uFillTx/>
+                <a:latin typeface="Aptos" panose="02110004020202020204"/>
+                <a:ea typeface="+mn-ea"/>
+                <a:cs typeface="+mn-cs"/>
+              </a:rPr>
+              <a:t>Tabs for multiple</a:t>
+            </a:r>
+          </a:p>
+          <a:p>
+            <a:pPr marL="0" marR="0" lvl="0" indent="0" algn="ctr" defTabSz="914400" rtl="0" eaLnBrk="1" fontAlgn="auto" latinLnBrk="0" hangingPunct="1">
+              <a:lnSpc>
+                <a:spcPct val="100000"/>
+              </a:lnSpc>
+              <a:spcBef>
+                <a:spcPts val="0"/>
+              </a:spcBef>
+              <a:spcAft>
+                <a:spcPts val="0"/>
+              </a:spcAft>
+              <a:buClrTx/>
+              <a:buSzTx/>
+              <a:buFontTx/>
+              <a:buNone/>
+              <a:tabLst/>
+              <a:defRPr/>
+            </a:pPr>
+            <a:r>
+              <a:rPr kumimoji="0" lang="en-US" sz="1800" b="1" i="0" u="none" strike="noStrike" kern="1200" cap="none" spc="0" normalizeH="0" baseline="0" noProof="0">
+                <a:ln>
+                  <a:noFill/>
+                </a:ln>
+                <a:solidFill>
+                  <a:prstClr val="black"/>
+                </a:solidFill>
+                <a:effectLst/>
+                <a:uLnTx/>
+                <a:uFillTx/>
+                <a:latin typeface="Aptos" panose="02110004020202020204"/>
+                <a:ea typeface="+mn-ea"/>
+                <a:cs typeface="+mn-cs"/>
+              </a:rPr>
+              <a:t>model runs</a:t>
+            </a:r>
+          </a:p>
+        </p:txBody>
+      </p:sp>
+      <p:cxnSp>
+        <p:nvCxnSpPr>
+          <p:cNvPr id="12" name="Straight Arrow Connector 11">
+            <a:extLst>
+              <a:ext uri="{FF2B5EF4-FFF2-40B4-BE49-F238E27FC236}">
+                <a16:creationId xmlns:a16="http://schemas.microsoft.com/office/drawing/2014/main" id="{C15E11CD-0C7D-927D-A8A6-A1AE80ECD140}"/>
+              </a:ext>
+            </a:extLst>
+          </p:cNvPr>
+          <p:cNvCxnSpPr>
+            <a:cxnSpLocks/>
+          </p:cNvCxnSpPr>
+          <p:nvPr/>
+        </p:nvCxnSpPr>
+        <p:spPr>
+          <a:xfrm flipH="1">
+            <a:off x="6349242" y="1038681"/>
+            <a:ext cx="319119" cy="669349"/>
+          </a:xfrm>
+          <a:prstGeom prst="straightConnector1">
+            <a:avLst/>
+          </a:prstGeom>
+          <a:ln w="76200">
+            <a:solidFill>
+              <a:schemeClr val="accent2"/>
+            </a:solidFill>
+            <a:tailEnd type="triangle"/>
+          </a:ln>
+        </p:spPr>
+        <p:style>
+          <a:lnRef idx="2">
+            <a:schemeClr val="accent1"/>
+          </a:lnRef>
+          <a:fillRef idx="0">
+            <a:schemeClr val="accent1"/>
+          </a:fillRef>
+          <a:effectRef idx="1">
+            <a:schemeClr val="accent1"/>
+          </a:effectRef>
+          <a:fontRef idx="minor">
+            <a:schemeClr val="tx1"/>
+          </a:fontRef>
+        </p:style>
+      </p:cxnSp>
+      <p:cxnSp>
+        <p:nvCxnSpPr>
+          <p:cNvPr id="14" name="Straight Arrow Connector 13">
+            <a:extLst>
+              <a:ext uri="{FF2B5EF4-FFF2-40B4-BE49-F238E27FC236}">
+                <a16:creationId xmlns:a16="http://schemas.microsoft.com/office/drawing/2014/main" id="{717335C5-31BD-1044-52AF-66F7F451B5E9}"/>
+              </a:ext>
+            </a:extLst>
+          </p:cNvPr>
+          <p:cNvCxnSpPr>
+            <a:cxnSpLocks/>
+          </p:cNvCxnSpPr>
+          <p:nvPr/>
+        </p:nvCxnSpPr>
+        <p:spPr>
+          <a:xfrm>
+            <a:off x="7326090" y="1067435"/>
+            <a:ext cx="362519" cy="611840"/>
+          </a:xfrm>
+          <a:prstGeom prst="straightConnector1">
+            <a:avLst/>
+          </a:prstGeom>
+          <a:ln w="76200">
+            <a:solidFill>
+              <a:schemeClr val="accent2"/>
+            </a:solidFill>
+            <a:tailEnd type="triangle"/>
+          </a:ln>
+        </p:spPr>
+        <p:style>
+          <a:lnRef idx="2">
+            <a:schemeClr val="accent1"/>
+          </a:lnRef>
+          <a:fillRef idx="0">
+            <a:schemeClr val="accent1"/>
+          </a:fillRef>
+          <a:effectRef idx="1">
+            <a:schemeClr val="accent1"/>
+          </a:effectRef>
+          <a:fontRef idx="minor">
+            <a:schemeClr val="tx1"/>
+          </a:fontRef>
+        </p:style>
+      </p:cxnSp>
+      <p:sp>
+        <p:nvSpPr>
+          <p:cNvPr id="19" name="Rectangle 18">
+            <a:extLst>
+              <a:ext uri="{FF2B5EF4-FFF2-40B4-BE49-F238E27FC236}">
+                <a16:creationId xmlns:a16="http://schemas.microsoft.com/office/drawing/2014/main" id="{267004BF-2C41-1E87-56E5-F7577ADA3C4D}"/>
+              </a:ext>
+            </a:extLst>
+          </p:cNvPr>
+          <p:cNvSpPr/>
+          <p:nvPr/>
+        </p:nvSpPr>
+        <p:spPr>
+          <a:xfrm>
+            <a:off x="4726805" y="1977145"/>
+            <a:ext cx="7053154" cy="4880854"/>
+          </a:xfrm>
+          <a:prstGeom prst="rect">
+            <a:avLst/>
+          </a:prstGeom>
+          <a:noFill/>
+          <a:ln w="57150">
+            <a:solidFill>
+              <a:schemeClr val="accent2"/>
+            </a:solidFill>
+          </a:ln>
+        </p:spPr>
+        <p:style>
+          <a:lnRef idx="2">
+            <a:schemeClr val="accent1">
+              <a:shade val="15000"/>
+            </a:schemeClr>
+          </a:lnRef>
+          <a:fillRef idx="1">
+            <a:schemeClr val="accent1"/>
+          </a:fillRef>
+          <a:effectRef idx="0">
+            <a:schemeClr val="accent1"/>
+          </a:effectRef>
+          <a:fontRef idx="minor">
+            <a:schemeClr val="lt1"/>
+          </a:fontRef>
+        </p:style>
+        <p:txBody>
+          <a:bodyPr rtlCol="0" anchor="ctr"/>
+          <a:lstStyle/>
+          <a:p>
+            <a:pPr marL="0" marR="0" lvl="0" indent="0" algn="ctr" defTabSz="914400" rtl="0" eaLnBrk="1" fontAlgn="auto" latinLnBrk="0" hangingPunct="1">
+              <a:lnSpc>
+                <a:spcPct val="100000"/>
+              </a:lnSpc>
+              <a:spcBef>
+                <a:spcPts val="0"/>
+              </a:spcBef>
+              <a:spcAft>
+                <a:spcPts val="0"/>
+              </a:spcAft>
+              <a:buClrTx/>
+              <a:buSzTx/>
+              <a:buFontTx/>
+              <a:buNone/>
+              <a:tabLst/>
+              <a:defRPr/>
+            </a:pPr>
+            <a:endParaRPr kumimoji="0" lang="en-US" sz="1800" b="0" i="0" u="none" strike="noStrike" kern="1200" cap="none" spc="0" normalizeH="0" baseline="0" noProof="0">
+              <a:ln>
+                <a:noFill/>
+              </a:ln>
+              <a:solidFill>
+                <a:prstClr val="white"/>
+              </a:solidFill>
+              <a:effectLst/>
+              <a:uLnTx/>
+              <a:uFillTx/>
+              <a:latin typeface="Aptos" panose="02110004020202020204"/>
+              <a:ea typeface="+mn-ea"/>
+              <a:cs typeface="+mn-cs"/>
+            </a:endParaRPr>
+          </a:p>
+        </p:txBody>
+      </p:sp>
+      <p:sp>
+        <p:nvSpPr>
+          <p:cNvPr id="20" name="TextBox 19">
+            <a:extLst>
+              <a:ext uri="{FF2B5EF4-FFF2-40B4-BE49-F238E27FC236}">
+                <a16:creationId xmlns:a16="http://schemas.microsoft.com/office/drawing/2014/main" id="{5F94346C-7DF8-6858-9BD3-B5657A697610}"/>
+              </a:ext>
+            </a:extLst>
+          </p:cNvPr>
+          <p:cNvSpPr txBox="1"/>
+          <p:nvPr/>
+        </p:nvSpPr>
+        <p:spPr>
+          <a:xfrm>
+            <a:off x="119848" y="2625311"/>
+            <a:ext cx="2210488" cy="492443"/>
+          </a:xfrm>
+          <a:prstGeom prst="rect">
+            <a:avLst/>
+          </a:prstGeom>
+          <a:noFill/>
+        </p:spPr>
+        <p:txBody>
+          <a:bodyPr wrap="square" rtlCol="0">
+            <a:spAutoFit/>
+          </a:bodyPr>
+          <a:lstStyle/>
+          <a:p>
+            <a:pPr marL="0" marR="0" lvl="0" indent="0" algn="l" defTabSz="914400" rtl="0" eaLnBrk="1" fontAlgn="auto" latinLnBrk="0" hangingPunct="1">
+              <a:lnSpc>
+                <a:spcPct val="100000"/>
+              </a:lnSpc>
+              <a:spcBef>
+                <a:spcPts val="0"/>
+              </a:spcBef>
+              <a:spcAft>
+                <a:spcPts val="0"/>
+              </a:spcAft>
+              <a:buClrTx/>
+              <a:buSzTx/>
+              <a:buFontTx/>
+              <a:buNone/>
+              <a:tabLst/>
+              <a:defRPr/>
+            </a:pPr>
+            <a:r>
+              <a:rPr kumimoji="0" lang="en-US" sz="1300" b="1" i="0" u="none" strike="noStrike" kern="1200" cap="none" spc="0" normalizeH="0" baseline="0" noProof="0">
+                <a:ln>
+                  <a:noFill/>
+                </a:ln>
+                <a:solidFill>
+                  <a:prstClr val="black"/>
+                </a:solidFill>
+                <a:effectLst/>
+                <a:uLnTx/>
+                <a:uFillTx/>
+                <a:latin typeface="Aptos" panose="02110004020202020204"/>
+                <a:ea typeface="+mn-ea"/>
+                <a:cs typeface="+mn-cs"/>
+              </a:rPr>
+              <a:t>Save parameters and optionally data to a file</a:t>
+            </a:r>
+          </a:p>
+        </p:txBody>
+      </p:sp>
+      <p:sp>
+        <p:nvSpPr>
+          <p:cNvPr id="27" name="TextBox 26">
+            <a:extLst>
+              <a:ext uri="{FF2B5EF4-FFF2-40B4-BE49-F238E27FC236}">
+                <a16:creationId xmlns:a16="http://schemas.microsoft.com/office/drawing/2014/main" id="{34277E71-06DD-CD2F-75A0-18C4075BD116}"/>
+              </a:ext>
+            </a:extLst>
+          </p:cNvPr>
+          <p:cNvSpPr txBox="1"/>
+          <p:nvPr/>
+        </p:nvSpPr>
+        <p:spPr>
+          <a:xfrm>
+            <a:off x="165402" y="1848356"/>
+            <a:ext cx="2044460" cy="692497"/>
+          </a:xfrm>
+          <a:prstGeom prst="rect">
+            <a:avLst/>
+          </a:prstGeom>
+          <a:noFill/>
+        </p:spPr>
+        <p:txBody>
+          <a:bodyPr wrap="square" rtlCol="0">
+            <a:spAutoFit/>
+          </a:bodyPr>
+          <a:lstStyle/>
+          <a:p>
+            <a:pPr marL="0" marR="0" lvl="0" indent="0" algn="l" defTabSz="914400" rtl="0" eaLnBrk="1" fontAlgn="auto" latinLnBrk="0" hangingPunct="1">
+              <a:lnSpc>
+                <a:spcPct val="100000"/>
+              </a:lnSpc>
+              <a:spcBef>
+                <a:spcPts val="0"/>
+              </a:spcBef>
+              <a:spcAft>
+                <a:spcPts val="0"/>
+              </a:spcAft>
+              <a:buClrTx/>
+              <a:buSzTx/>
+              <a:buFontTx/>
+              <a:buNone/>
+              <a:tabLst/>
+              <a:defRPr/>
+            </a:pPr>
+            <a:r>
+              <a:rPr kumimoji="0" lang="en-US" sz="1300" b="1" i="0" u="none" strike="noStrike" kern="1200" cap="none" spc="0" normalizeH="0" baseline="0" noProof="0">
+                <a:ln>
+                  <a:noFill/>
+                </a:ln>
+                <a:solidFill>
+                  <a:prstClr val="black"/>
+                </a:solidFill>
+                <a:effectLst/>
+                <a:uLnTx/>
+                <a:uFillTx/>
+                <a:latin typeface="Aptos" panose="02110004020202020204"/>
+                <a:ea typeface="+mn-ea"/>
+                <a:cs typeface="+mn-cs"/>
+              </a:rPr>
+              <a:t>Load parameters and optionally data from a saved file</a:t>
+            </a:r>
+          </a:p>
+        </p:txBody>
+      </p:sp>
+      <p:cxnSp>
+        <p:nvCxnSpPr>
+          <p:cNvPr id="28" name="Straight Arrow Connector 27">
+            <a:extLst>
+              <a:ext uri="{FF2B5EF4-FFF2-40B4-BE49-F238E27FC236}">
+                <a16:creationId xmlns:a16="http://schemas.microsoft.com/office/drawing/2014/main" id="{BE39B579-D167-D587-E413-7C4410ECEF78}"/>
+              </a:ext>
+            </a:extLst>
+          </p:cNvPr>
+          <p:cNvCxnSpPr>
+            <a:cxnSpLocks/>
+          </p:cNvCxnSpPr>
+          <p:nvPr/>
+        </p:nvCxnSpPr>
+        <p:spPr>
+          <a:xfrm>
+            <a:off x="1616244" y="2370736"/>
+            <a:ext cx="955040" cy="346441"/>
+          </a:xfrm>
+          <a:prstGeom prst="straightConnector1">
+            <a:avLst/>
+          </a:prstGeom>
+          <a:ln w="57150">
+            <a:solidFill>
+              <a:srgbClr val="996633"/>
+            </a:solidFill>
+            <a:tailEnd type="triangle"/>
+          </a:ln>
+        </p:spPr>
+        <p:style>
+          <a:lnRef idx="2">
+            <a:schemeClr val="accent1"/>
+          </a:lnRef>
+          <a:fillRef idx="0">
+            <a:schemeClr val="accent1"/>
+          </a:fillRef>
+          <a:effectRef idx="1">
+            <a:schemeClr val="accent1"/>
+          </a:effectRef>
+          <a:fontRef idx="minor">
+            <a:schemeClr val="tx1"/>
+          </a:fontRef>
+        </p:style>
+      </p:cxnSp>
+      <p:cxnSp>
+        <p:nvCxnSpPr>
+          <p:cNvPr id="32" name="Straight Arrow Connector 31">
+            <a:extLst>
+              <a:ext uri="{FF2B5EF4-FFF2-40B4-BE49-F238E27FC236}">
+                <a16:creationId xmlns:a16="http://schemas.microsoft.com/office/drawing/2014/main" id="{A29F1428-F8D3-FAD8-985F-8B26783AD181}"/>
+              </a:ext>
+            </a:extLst>
+          </p:cNvPr>
+          <p:cNvCxnSpPr>
+            <a:cxnSpLocks/>
+          </p:cNvCxnSpPr>
+          <p:nvPr/>
+        </p:nvCxnSpPr>
+        <p:spPr>
+          <a:xfrm>
+            <a:off x="1988778" y="2971637"/>
+            <a:ext cx="582506" cy="0"/>
+          </a:xfrm>
+          <a:prstGeom prst="straightConnector1">
+            <a:avLst/>
+          </a:prstGeom>
+          <a:ln w="57150">
+            <a:solidFill>
+              <a:srgbClr val="996633"/>
+            </a:solidFill>
+            <a:tailEnd type="triangle"/>
+          </a:ln>
+        </p:spPr>
+        <p:style>
+          <a:lnRef idx="2">
+            <a:schemeClr val="accent1"/>
+          </a:lnRef>
+          <a:fillRef idx="0">
+            <a:schemeClr val="accent1"/>
+          </a:fillRef>
+          <a:effectRef idx="1">
+            <a:schemeClr val="accent1"/>
+          </a:effectRef>
+          <a:fontRef idx="minor">
+            <a:schemeClr val="tx1"/>
+          </a:fontRef>
+        </p:style>
+      </p:cxnSp>
+      <p:sp>
+        <p:nvSpPr>
+          <p:cNvPr id="35" name="TextBox 34">
+            <a:extLst>
+              <a:ext uri="{FF2B5EF4-FFF2-40B4-BE49-F238E27FC236}">
+                <a16:creationId xmlns:a16="http://schemas.microsoft.com/office/drawing/2014/main" id="{BDAFF116-8641-9CC8-DAF2-4EFDB6966645}"/>
+              </a:ext>
+            </a:extLst>
+          </p:cNvPr>
+          <p:cNvSpPr txBox="1"/>
+          <p:nvPr/>
+        </p:nvSpPr>
+        <p:spPr>
+          <a:xfrm>
+            <a:off x="119848" y="3196231"/>
+            <a:ext cx="2210485" cy="492443"/>
+          </a:xfrm>
+          <a:prstGeom prst="rect">
+            <a:avLst/>
+          </a:prstGeom>
+          <a:noFill/>
+        </p:spPr>
+        <p:txBody>
+          <a:bodyPr wrap="square" rtlCol="0">
+            <a:spAutoFit/>
+          </a:bodyPr>
+          <a:lstStyle/>
+          <a:p>
+            <a:pPr marL="0" marR="0" lvl="0" indent="0" algn="l" defTabSz="914400" rtl="0" eaLnBrk="1" fontAlgn="auto" latinLnBrk="0" hangingPunct="1">
+              <a:lnSpc>
+                <a:spcPct val="100000"/>
+              </a:lnSpc>
+              <a:spcBef>
+                <a:spcPts val="0"/>
+              </a:spcBef>
+              <a:spcAft>
+                <a:spcPts val="0"/>
+              </a:spcAft>
+              <a:buClrTx/>
+              <a:buSzTx/>
+              <a:buFontTx/>
+              <a:buNone/>
+              <a:tabLst/>
+              <a:defRPr/>
+            </a:pPr>
+            <a:r>
+              <a:rPr kumimoji="0" lang="en-US" sz="1300" b="1" i="0" u="none" strike="noStrike" kern="1200" cap="none" spc="0" normalizeH="0" baseline="0" noProof="0">
+                <a:ln>
+                  <a:noFill/>
+                </a:ln>
+                <a:solidFill>
+                  <a:prstClr val="black"/>
+                </a:solidFill>
+                <a:effectLst/>
+                <a:uLnTx/>
+                <a:uFillTx/>
+                <a:latin typeface="Aptos" panose="02110004020202020204"/>
+                <a:ea typeface="+mn-ea"/>
+                <a:cs typeface="+mn-cs"/>
+              </a:rPr>
+              <a:t>Link to User Guide  </a:t>
+            </a:r>
+          </a:p>
+          <a:p>
+            <a:pPr marL="0" marR="0" lvl="0" indent="0" algn="l" defTabSz="914400" rtl="0" eaLnBrk="1" fontAlgn="auto" latinLnBrk="0" hangingPunct="1">
+              <a:lnSpc>
+                <a:spcPct val="100000"/>
+              </a:lnSpc>
+              <a:spcBef>
+                <a:spcPts val="0"/>
+              </a:spcBef>
+              <a:spcAft>
+                <a:spcPts val="0"/>
+              </a:spcAft>
+              <a:buClrTx/>
+              <a:buSzTx/>
+              <a:buFontTx/>
+              <a:buNone/>
+              <a:tabLst/>
+              <a:defRPr/>
+            </a:pPr>
+            <a:r>
+              <a:rPr kumimoji="0" lang="en-US" sz="1300" b="1" i="0" u="none" strike="noStrike" kern="1200" cap="none" spc="0" normalizeH="0" baseline="0" noProof="0">
+                <a:ln>
+                  <a:noFill/>
+                </a:ln>
+                <a:solidFill>
+                  <a:prstClr val="black"/>
+                </a:solidFill>
+                <a:effectLst/>
+                <a:uLnTx/>
+                <a:uFillTx/>
+                <a:latin typeface="Aptos" panose="02110004020202020204"/>
+                <a:ea typeface="+mn-ea"/>
+                <a:cs typeface="+mn-cs"/>
+              </a:rPr>
+              <a:t>chapter for this model</a:t>
+            </a:r>
+          </a:p>
+        </p:txBody>
+      </p:sp>
+      <p:cxnSp>
+        <p:nvCxnSpPr>
+          <p:cNvPr id="36" name="Straight Arrow Connector 35">
+            <a:extLst>
+              <a:ext uri="{FF2B5EF4-FFF2-40B4-BE49-F238E27FC236}">
+                <a16:creationId xmlns:a16="http://schemas.microsoft.com/office/drawing/2014/main" id="{93CCD9E3-F8F8-49AC-3F30-426AA4847D1A}"/>
+              </a:ext>
+            </a:extLst>
+          </p:cNvPr>
+          <p:cNvCxnSpPr>
+            <a:cxnSpLocks/>
+          </p:cNvCxnSpPr>
+          <p:nvPr/>
+        </p:nvCxnSpPr>
+        <p:spPr>
+          <a:xfrm flipV="1">
+            <a:off x="1772031" y="3265817"/>
+            <a:ext cx="799253" cy="90298"/>
+          </a:xfrm>
+          <a:prstGeom prst="straightConnector1">
+            <a:avLst/>
+          </a:prstGeom>
+          <a:ln w="57150">
+            <a:solidFill>
+              <a:srgbClr val="996633"/>
+            </a:solidFill>
+            <a:tailEnd type="triangle"/>
+          </a:ln>
+        </p:spPr>
+        <p:style>
+          <a:lnRef idx="2">
+            <a:schemeClr val="accent1"/>
+          </a:lnRef>
+          <a:fillRef idx="0">
+            <a:schemeClr val="accent1"/>
+          </a:fillRef>
+          <a:effectRef idx="1">
+            <a:schemeClr val="accent1"/>
+          </a:effectRef>
+          <a:fontRef idx="minor">
+            <a:schemeClr val="tx1"/>
+          </a:fontRef>
+        </p:style>
+      </p:cxnSp>
+      <p:sp>
+        <p:nvSpPr>
+          <p:cNvPr id="37" name="TextBox 36">
+            <a:extLst>
+              <a:ext uri="{FF2B5EF4-FFF2-40B4-BE49-F238E27FC236}">
+                <a16:creationId xmlns:a16="http://schemas.microsoft.com/office/drawing/2014/main" id="{4E5FCB52-C705-D2E0-F932-A088FF291F01}"/>
+              </a:ext>
+            </a:extLst>
+          </p:cNvPr>
+          <p:cNvSpPr txBox="1"/>
+          <p:nvPr/>
+        </p:nvSpPr>
+        <p:spPr>
+          <a:xfrm>
+            <a:off x="119848" y="3731958"/>
+            <a:ext cx="2210488" cy="492443"/>
+          </a:xfrm>
+          <a:prstGeom prst="rect">
+            <a:avLst/>
+          </a:prstGeom>
+          <a:noFill/>
+        </p:spPr>
+        <p:txBody>
+          <a:bodyPr wrap="square" rtlCol="0">
+            <a:spAutoFit/>
+          </a:bodyPr>
+          <a:lstStyle/>
+          <a:p>
+            <a:pPr marL="0" marR="0" lvl="0" indent="0" algn="l" defTabSz="914400" rtl="0" eaLnBrk="1" fontAlgn="auto" latinLnBrk="0" hangingPunct="1">
+              <a:lnSpc>
+                <a:spcPct val="100000"/>
+              </a:lnSpc>
+              <a:spcBef>
+                <a:spcPts val="0"/>
+              </a:spcBef>
+              <a:spcAft>
+                <a:spcPts val="0"/>
+              </a:spcAft>
+              <a:buClrTx/>
+              <a:buSzTx/>
+              <a:buFontTx/>
+              <a:buNone/>
+              <a:tabLst/>
+              <a:defRPr/>
+            </a:pPr>
+            <a:r>
+              <a:rPr kumimoji="0" lang="en-US" sz="1300" b="1" i="0" u="none" strike="noStrike" kern="1200" cap="none" spc="0" normalizeH="0" baseline="0" noProof="0">
+                <a:ln>
+                  <a:noFill/>
+                </a:ln>
+                <a:solidFill>
+                  <a:prstClr val="black"/>
+                </a:solidFill>
+                <a:effectLst/>
+                <a:uLnTx/>
+                <a:uFillTx/>
+                <a:latin typeface="Aptos" panose="02110004020202020204"/>
+                <a:ea typeface="+mn-ea"/>
+                <a:cs typeface="+mn-cs"/>
+              </a:rPr>
+              <a:t>Link to Community Forum posts related to this model</a:t>
+            </a:r>
+          </a:p>
+        </p:txBody>
+      </p:sp>
+      <p:cxnSp>
+        <p:nvCxnSpPr>
+          <p:cNvPr id="44" name="Straight Arrow Connector 43">
+            <a:extLst>
+              <a:ext uri="{FF2B5EF4-FFF2-40B4-BE49-F238E27FC236}">
+                <a16:creationId xmlns:a16="http://schemas.microsoft.com/office/drawing/2014/main" id="{F73D1A3D-3948-7D66-69FB-BED1D0E0FC17}"/>
+              </a:ext>
+            </a:extLst>
+          </p:cNvPr>
+          <p:cNvCxnSpPr>
+            <a:cxnSpLocks/>
+          </p:cNvCxnSpPr>
+          <p:nvPr/>
+        </p:nvCxnSpPr>
+        <p:spPr>
+          <a:xfrm flipV="1">
+            <a:off x="2175995" y="3645640"/>
+            <a:ext cx="594823" cy="276104"/>
+          </a:xfrm>
+          <a:prstGeom prst="straightConnector1">
+            <a:avLst/>
+          </a:prstGeom>
+          <a:ln w="57150">
+            <a:solidFill>
+              <a:srgbClr val="996633"/>
+            </a:solidFill>
+            <a:tailEnd type="triangle"/>
+          </a:ln>
+        </p:spPr>
+        <p:style>
+          <a:lnRef idx="2">
+            <a:schemeClr val="accent1"/>
+          </a:lnRef>
+          <a:fillRef idx="0">
+            <a:schemeClr val="accent1"/>
+          </a:fillRef>
+          <a:effectRef idx="1">
+            <a:schemeClr val="accent1"/>
+          </a:effectRef>
+          <a:fontRef idx="minor">
+            <a:schemeClr val="tx1"/>
+          </a:fontRef>
+        </p:style>
+      </p:cxnSp>
+    </p:spTree>
+    <p:extLst>
+      <p:ext uri="{BB962C8B-B14F-4D97-AF65-F5344CB8AC3E}">
+        <p14:creationId xmlns:p14="http://schemas.microsoft.com/office/powerpoint/2010/main" val="3483544816"/>
+      </p:ext>
+    </p:extLst>
+  </p:cSld>
+  <p:clrMapOvr>
+    <a:masterClrMapping/>
+  </p:clrMapOvr>
+</p:sld>
+</file>
+
+<file path=ppt/slides/slide5.xml><?xml version="1.0" encoding="utf-8"?>
+<p:sld xmlns:a="http://schemas.openxmlformats.org/drawingml/2006/main" xmlns:r="http://schemas.openxmlformats.org/officeDocument/2006/relationships" xmlns:p="http://schemas.openxmlformats.org/presentationml/2006/main">
+  <p:cSld>
+    <p:spTree>
+      <p:nvGrpSpPr>
+        <p:cNvPr id="1" name="">
+          <a:extLst>
+            <a:ext uri="{FF2B5EF4-FFF2-40B4-BE49-F238E27FC236}">
+              <a16:creationId xmlns:a16="http://schemas.microsoft.com/office/drawing/2014/main" id="{5F3D4310-5A80-BFE6-4766-9A94F797D4CA}"/>
+            </a:ext>
+          </a:extLst>
+        </p:cNvPr>
+        <p:cNvGrpSpPr/>
+        <p:nvPr/>
+      </p:nvGrpSpPr>
+      <p:grpSpPr>
+        <a:xfrm>
+          <a:off x="0" y="0"/>
+          <a:ext cx="0" cy="0"/>
+          <a:chOff x="0" y="0"/>
+          <a:chExt cx="0" cy="0"/>
+        </a:xfrm>
+      </p:grpSpPr>
+      <p:pic>
+        <p:nvPicPr>
+          <p:cNvPr id="5" name="Picture 4">
+            <a:extLst>
+              <a:ext uri="{FF2B5EF4-FFF2-40B4-BE49-F238E27FC236}">
+                <a16:creationId xmlns:a16="http://schemas.microsoft.com/office/drawing/2014/main" id="{66C32761-02F0-B552-B0B3-E9EFFFE433C9}"/>
+              </a:ext>
+            </a:extLst>
+          </p:cNvPr>
+          <p:cNvPicPr>
+            <a:picLocks noChangeAspect="1"/>
+          </p:cNvPicPr>
+          <p:nvPr/>
+        </p:nvPicPr>
+        <p:blipFill>
+          <a:blip r:embed="rId2"/>
+          <a:stretch>
+            <a:fillRect/>
+          </a:stretch>
+        </p:blipFill>
+        <p:spPr>
+          <a:xfrm>
+            <a:off x="2171030" y="1225366"/>
+            <a:ext cx="9106281" cy="5493601"/>
+          </a:xfrm>
+          <a:prstGeom prst="rect">
+            <a:avLst/>
+          </a:prstGeom>
+        </p:spPr>
+      </p:pic>
+      <p:sp>
+        <p:nvSpPr>
+          <p:cNvPr id="7" name="TextBox 6">
+            <a:extLst>
+              <a:ext uri="{FF2B5EF4-FFF2-40B4-BE49-F238E27FC236}">
+                <a16:creationId xmlns:a16="http://schemas.microsoft.com/office/drawing/2014/main" id="{02FDB200-DAB9-FF32-F701-380CC1CCDD6C}"/>
+              </a:ext>
+            </a:extLst>
+          </p:cNvPr>
+          <p:cNvSpPr txBox="1"/>
+          <p:nvPr/>
+        </p:nvSpPr>
+        <p:spPr>
+          <a:xfrm>
+            <a:off x="190836" y="2262720"/>
+            <a:ext cx="1778158" cy="738664"/>
+          </a:xfrm>
+          <a:prstGeom prst="rect">
+            <a:avLst/>
+          </a:prstGeom>
+          <a:noFill/>
+        </p:spPr>
+        <p:txBody>
+          <a:bodyPr wrap="square" rtlCol="0">
+            <a:spAutoFit/>
+          </a:bodyPr>
+          <a:lstStyle/>
+          <a:p>
+            <a:pPr marL="0" marR="0" lvl="0" indent="0" algn="l" defTabSz="914400" rtl="0" eaLnBrk="1" fontAlgn="auto" latinLnBrk="0" hangingPunct="1">
+              <a:lnSpc>
+                <a:spcPct val="100000"/>
+              </a:lnSpc>
+              <a:spcBef>
+                <a:spcPts val="0"/>
+              </a:spcBef>
+              <a:spcAft>
+                <a:spcPts val="0"/>
+              </a:spcAft>
+              <a:buClrTx/>
+              <a:buSzTx/>
+              <a:buFontTx/>
+              <a:buNone/>
+              <a:tabLst/>
+              <a:defRPr/>
+            </a:pPr>
+            <a:r>
+              <a:rPr kumimoji="0" lang="en-US" sz="1400" b="1" i="0" u="none" strike="noStrike" kern="1200" cap="none" spc="0" normalizeH="0" baseline="0" noProof="0">
+                <a:ln>
+                  <a:noFill/>
+                </a:ln>
+                <a:solidFill>
+                  <a:prstClr val="black"/>
+                </a:solidFill>
+                <a:effectLst/>
+                <a:uLnTx/>
+                <a:uFillTx/>
+                <a:latin typeface="Aptos" panose="02110004020202020204"/>
+                <a:ea typeface="+mn-ea"/>
+                <a:cs typeface="+mn-cs"/>
+              </a:rPr>
+              <a:t>View logging messages for this model run </a:t>
+            </a:r>
+          </a:p>
+        </p:txBody>
+      </p:sp>
+      <p:sp>
+        <p:nvSpPr>
+          <p:cNvPr id="8" name="TextBox 7">
+            <a:extLst>
+              <a:ext uri="{FF2B5EF4-FFF2-40B4-BE49-F238E27FC236}">
+                <a16:creationId xmlns:a16="http://schemas.microsoft.com/office/drawing/2014/main" id="{713BA01C-4E2A-61B4-48A3-22158008EFC7}"/>
+              </a:ext>
+            </a:extLst>
+          </p:cNvPr>
+          <p:cNvSpPr txBox="1"/>
+          <p:nvPr/>
+        </p:nvSpPr>
+        <p:spPr>
+          <a:xfrm>
+            <a:off x="8129960" y="392350"/>
+            <a:ext cx="1244636" cy="646331"/>
+          </a:xfrm>
+          <a:prstGeom prst="rect">
+            <a:avLst/>
+          </a:prstGeom>
+          <a:noFill/>
+        </p:spPr>
+        <p:txBody>
+          <a:bodyPr wrap="none" rtlCol="0">
+            <a:spAutoFit/>
+          </a:bodyPr>
+          <a:lstStyle/>
+          <a:p>
+            <a:pPr marL="0" marR="0" lvl="0" indent="0" algn="ctr" defTabSz="914400" rtl="0" eaLnBrk="1" fontAlgn="auto" latinLnBrk="0" hangingPunct="1">
+              <a:lnSpc>
+                <a:spcPct val="100000"/>
+              </a:lnSpc>
+              <a:spcBef>
+                <a:spcPts val="0"/>
+              </a:spcBef>
+              <a:spcAft>
+                <a:spcPts val="0"/>
+              </a:spcAft>
+              <a:buClrTx/>
+              <a:buSzTx/>
+              <a:buFontTx/>
+              <a:buNone/>
+              <a:tabLst/>
+              <a:defRPr/>
+            </a:pPr>
+            <a:r>
+              <a:rPr kumimoji="0" lang="en-US" sz="1800" b="1" i="0" u="none" strike="noStrike" kern="1200" cap="none" spc="0" normalizeH="0" baseline="0" noProof="0">
+                <a:ln>
+                  <a:noFill/>
+                </a:ln>
+                <a:solidFill>
+                  <a:prstClr val="black"/>
+                </a:solidFill>
+                <a:effectLst/>
+                <a:uLnTx/>
+                <a:uFillTx/>
+                <a:latin typeface="Aptos" panose="02110004020202020204"/>
+                <a:ea typeface="+mn-ea"/>
+                <a:cs typeface="+mn-cs"/>
+              </a:rPr>
+              <a:t>Logging</a:t>
+            </a:r>
+          </a:p>
+          <a:p>
+            <a:pPr marL="0" marR="0" lvl="0" indent="0" algn="ctr" defTabSz="914400" rtl="0" eaLnBrk="1" fontAlgn="auto" latinLnBrk="0" hangingPunct="1">
+              <a:lnSpc>
+                <a:spcPct val="100000"/>
+              </a:lnSpc>
+              <a:spcBef>
+                <a:spcPts val="0"/>
+              </a:spcBef>
+              <a:spcAft>
+                <a:spcPts val="0"/>
+              </a:spcAft>
+              <a:buClrTx/>
+              <a:buSzTx/>
+              <a:buFontTx/>
+              <a:buNone/>
+              <a:tabLst/>
+              <a:defRPr/>
+            </a:pPr>
+            <a:r>
+              <a:rPr kumimoji="0" lang="en-US" sz="1800" b="1" i="0" u="none" strike="noStrike" kern="1200" cap="none" spc="0" normalizeH="0" baseline="0" noProof="0">
+                <a:ln>
+                  <a:noFill/>
+                </a:ln>
+                <a:solidFill>
+                  <a:prstClr val="black"/>
+                </a:solidFill>
+                <a:effectLst/>
+                <a:uLnTx/>
+                <a:uFillTx/>
+                <a:latin typeface="Aptos" panose="02110004020202020204"/>
+                <a:ea typeface="+mn-ea"/>
+                <a:cs typeface="+mn-cs"/>
+              </a:rPr>
+              <a:t>messages</a:t>
+            </a:r>
+          </a:p>
+        </p:txBody>
+      </p:sp>
+      <p:cxnSp>
+        <p:nvCxnSpPr>
+          <p:cNvPr id="11" name="Straight Arrow Connector 10">
+            <a:extLst>
+              <a:ext uri="{FF2B5EF4-FFF2-40B4-BE49-F238E27FC236}">
+                <a16:creationId xmlns:a16="http://schemas.microsoft.com/office/drawing/2014/main" id="{A7ECBA84-7503-83E3-3B36-B3D9BBD58797}"/>
+              </a:ext>
+            </a:extLst>
+          </p:cNvPr>
+          <p:cNvCxnSpPr>
+            <a:cxnSpLocks/>
+          </p:cNvCxnSpPr>
+          <p:nvPr/>
+        </p:nvCxnSpPr>
+        <p:spPr>
+          <a:xfrm>
+            <a:off x="1443408" y="2417192"/>
+            <a:ext cx="667826" cy="0"/>
+          </a:xfrm>
+          <a:prstGeom prst="straightConnector1">
+            <a:avLst/>
+          </a:prstGeom>
+          <a:ln w="57150">
+            <a:solidFill>
+              <a:schemeClr val="accent2"/>
+            </a:solidFill>
+            <a:tailEnd type="triangle"/>
+          </a:ln>
+        </p:spPr>
+        <p:style>
+          <a:lnRef idx="2">
+            <a:schemeClr val="accent1"/>
+          </a:lnRef>
+          <a:fillRef idx="0">
+            <a:schemeClr val="accent1"/>
+          </a:fillRef>
+          <a:effectRef idx="1">
+            <a:schemeClr val="accent1"/>
+          </a:effectRef>
+          <a:fontRef idx="minor">
+            <a:schemeClr val="tx1"/>
+          </a:fontRef>
+        </p:style>
+      </p:cxnSp>
+      <p:cxnSp>
+        <p:nvCxnSpPr>
+          <p:cNvPr id="22" name="Straight Arrow Connector 21">
+            <a:extLst>
+              <a:ext uri="{FF2B5EF4-FFF2-40B4-BE49-F238E27FC236}">
+                <a16:creationId xmlns:a16="http://schemas.microsoft.com/office/drawing/2014/main" id="{0A4437DB-536B-6ACC-3591-5BCF0EA8E8AA}"/>
+              </a:ext>
+            </a:extLst>
+          </p:cNvPr>
+          <p:cNvCxnSpPr>
+            <a:cxnSpLocks/>
+          </p:cNvCxnSpPr>
+          <p:nvPr/>
+        </p:nvCxnSpPr>
+        <p:spPr>
+          <a:xfrm>
+            <a:off x="8752277" y="1038681"/>
+            <a:ext cx="1" cy="901458"/>
+          </a:xfrm>
+          <a:prstGeom prst="straightConnector1">
+            <a:avLst/>
+          </a:prstGeom>
+          <a:ln w="76200">
+            <a:solidFill>
+              <a:schemeClr val="accent2"/>
+            </a:solidFill>
+            <a:tailEnd type="triangle"/>
+          </a:ln>
+        </p:spPr>
+        <p:style>
+          <a:lnRef idx="2">
+            <a:schemeClr val="accent1"/>
+          </a:lnRef>
+          <a:fillRef idx="0">
+            <a:schemeClr val="accent1"/>
+          </a:fillRef>
+          <a:effectRef idx="1">
+            <a:schemeClr val="accent1"/>
+          </a:effectRef>
+          <a:fontRef idx="minor">
+            <a:schemeClr val="tx1"/>
+          </a:fontRef>
+        </p:style>
+      </p:cxnSp>
+      <p:sp>
+        <p:nvSpPr>
+          <p:cNvPr id="4" name="TextBox 3">
+            <a:extLst>
+              <a:ext uri="{FF2B5EF4-FFF2-40B4-BE49-F238E27FC236}">
+                <a16:creationId xmlns:a16="http://schemas.microsoft.com/office/drawing/2014/main" id="{7E810E5A-5B96-F9EC-4A0B-64AA7914B53A}"/>
+              </a:ext>
+            </a:extLst>
+          </p:cNvPr>
+          <p:cNvSpPr txBox="1"/>
+          <p:nvPr/>
+        </p:nvSpPr>
+        <p:spPr>
+          <a:xfrm>
+            <a:off x="2805570" y="4870014"/>
+            <a:ext cx="917559" cy="646331"/>
+          </a:xfrm>
+          <a:prstGeom prst="rect">
+            <a:avLst/>
+          </a:prstGeom>
+          <a:noFill/>
+        </p:spPr>
+        <p:txBody>
+          <a:bodyPr wrap="none" rtlCol="0">
+            <a:spAutoFit/>
+          </a:bodyPr>
+          <a:lstStyle/>
+          <a:p>
+            <a:pPr marL="0" marR="0" lvl="0" indent="0" algn="ctr" defTabSz="914400" rtl="0" eaLnBrk="1" fontAlgn="auto" latinLnBrk="0" hangingPunct="1">
+              <a:lnSpc>
+                <a:spcPct val="100000"/>
+              </a:lnSpc>
+              <a:spcBef>
+                <a:spcPts val="0"/>
+              </a:spcBef>
+              <a:spcAft>
+                <a:spcPts val="0"/>
+              </a:spcAft>
+              <a:buClrTx/>
+              <a:buSzTx/>
+              <a:buFontTx/>
+              <a:buNone/>
+              <a:tabLst/>
+              <a:defRPr/>
+            </a:pPr>
+            <a:r>
+              <a:rPr kumimoji="0" lang="en-US" sz="1800" b="1" i="0" u="none" strike="noStrike" kern="1200" cap="none" spc="0" normalizeH="0" baseline="0" noProof="0">
+                <a:ln>
+                  <a:noFill/>
+                </a:ln>
+                <a:solidFill>
+                  <a:prstClr val="black"/>
+                </a:solidFill>
+                <a:effectLst/>
+                <a:uLnTx/>
+                <a:uFillTx/>
+                <a:latin typeface="Aptos" panose="02110004020202020204"/>
+                <a:ea typeface="+mn-ea"/>
+                <a:cs typeface="+mn-cs"/>
+              </a:rPr>
+              <a:t>View</a:t>
+            </a:r>
+          </a:p>
+          <a:p>
+            <a:pPr marL="0" marR="0" lvl="0" indent="0" algn="ctr" defTabSz="914400" rtl="0" eaLnBrk="1" fontAlgn="auto" latinLnBrk="0" hangingPunct="1">
+              <a:lnSpc>
+                <a:spcPct val="100000"/>
+              </a:lnSpc>
+              <a:spcBef>
+                <a:spcPts val="0"/>
+              </a:spcBef>
+              <a:spcAft>
+                <a:spcPts val="0"/>
+              </a:spcAft>
+              <a:buClrTx/>
+              <a:buSzTx/>
+              <a:buFontTx/>
+              <a:buNone/>
+              <a:tabLst/>
+              <a:defRPr/>
+            </a:pPr>
+            <a:r>
+              <a:rPr kumimoji="0" lang="en-US" sz="1800" b="1" i="0" u="none" strike="noStrike" kern="1200" cap="none" spc="0" normalizeH="0" baseline="0" noProof="0">
+                <a:ln>
+                  <a:noFill/>
+                </a:ln>
+                <a:solidFill>
+                  <a:prstClr val="black"/>
+                </a:solidFill>
+                <a:effectLst/>
+                <a:uLnTx/>
+                <a:uFillTx/>
+                <a:latin typeface="Aptos" panose="02110004020202020204"/>
+                <a:ea typeface="+mn-ea"/>
+                <a:cs typeface="+mn-cs"/>
+              </a:rPr>
+              <a:t>results</a:t>
+            </a:r>
+          </a:p>
+        </p:txBody>
+      </p:sp>
+      <p:cxnSp>
+        <p:nvCxnSpPr>
+          <p:cNvPr id="10" name="Straight Arrow Connector 9">
+            <a:extLst>
+              <a:ext uri="{FF2B5EF4-FFF2-40B4-BE49-F238E27FC236}">
+                <a16:creationId xmlns:a16="http://schemas.microsoft.com/office/drawing/2014/main" id="{01A3FB45-149F-E7B3-DE96-D41FE5D615D9}"/>
+              </a:ext>
+            </a:extLst>
+          </p:cNvPr>
+          <p:cNvCxnSpPr>
+            <a:cxnSpLocks/>
+          </p:cNvCxnSpPr>
+          <p:nvPr/>
+        </p:nvCxnSpPr>
+        <p:spPr>
+          <a:xfrm>
+            <a:off x="3264350" y="5516345"/>
+            <a:ext cx="0" cy="676887"/>
+          </a:xfrm>
+          <a:prstGeom prst="straightConnector1">
+            <a:avLst/>
+          </a:prstGeom>
+          <a:ln w="76200">
+            <a:solidFill>
+              <a:schemeClr val="accent2"/>
+            </a:solidFill>
+            <a:tailEnd type="triangle"/>
+          </a:ln>
+        </p:spPr>
+        <p:style>
+          <a:lnRef idx="2">
+            <a:schemeClr val="accent1"/>
+          </a:lnRef>
+          <a:fillRef idx="0">
+            <a:schemeClr val="accent1"/>
+          </a:fillRef>
+          <a:effectRef idx="1">
+            <a:schemeClr val="accent1"/>
+          </a:effectRef>
+          <a:fontRef idx="minor">
+            <a:schemeClr val="tx1"/>
+          </a:fontRef>
+        </p:style>
+      </p:cxnSp>
+      <p:sp>
+        <p:nvSpPr>
+          <p:cNvPr id="21" name="TextBox 20">
+            <a:extLst>
+              <a:ext uri="{FF2B5EF4-FFF2-40B4-BE49-F238E27FC236}">
+                <a16:creationId xmlns:a16="http://schemas.microsoft.com/office/drawing/2014/main" id="{739249FD-038C-0F37-5F2D-89555D6D2F69}"/>
+              </a:ext>
+            </a:extLst>
+          </p:cNvPr>
+          <p:cNvSpPr txBox="1"/>
+          <p:nvPr/>
+        </p:nvSpPr>
+        <p:spPr>
+          <a:xfrm>
+            <a:off x="190836" y="1678529"/>
+            <a:ext cx="1939509" cy="523220"/>
+          </a:xfrm>
+          <a:prstGeom prst="rect">
+            <a:avLst/>
+          </a:prstGeom>
+          <a:noFill/>
+        </p:spPr>
+        <p:txBody>
+          <a:bodyPr wrap="square" rtlCol="0">
+            <a:spAutoFit/>
+          </a:bodyPr>
+          <a:lstStyle/>
+          <a:p>
+            <a:pPr marL="0" marR="0" lvl="0" indent="0" algn="l" defTabSz="914400" rtl="0" eaLnBrk="1" fontAlgn="auto" latinLnBrk="0" hangingPunct="1">
+              <a:lnSpc>
+                <a:spcPct val="100000"/>
+              </a:lnSpc>
+              <a:spcBef>
+                <a:spcPts val="0"/>
+              </a:spcBef>
+              <a:spcAft>
+                <a:spcPts val="0"/>
+              </a:spcAft>
+              <a:buClrTx/>
+              <a:buSzTx/>
+              <a:buFontTx/>
+              <a:buNone/>
+              <a:tabLst/>
+              <a:defRPr/>
+            </a:pPr>
+            <a:r>
+              <a:rPr kumimoji="0" lang="en-US" sz="1400" b="1" i="0" u="none" strike="noStrike" kern="1200" cap="none" spc="0" normalizeH="0" baseline="0" noProof="0">
+                <a:ln>
+                  <a:noFill/>
+                </a:ln>
+                <a:solidFill>
+                  <a:prstClr val="black"/>
+                </a:solidFill>
+                <a:effectLst/>
+                <a:uLnTx/>
+                <a:uFillTx/>
+                <a:latin typeface="Aptos" panose="02110004020202020204"/>
+                <a:ea typeface="+mn-ea"/>
+                <a:cs typeface="+mn-cs"/>
+              </a:rPr>
+              <a:t>Return to the model input screen</a:t>
+            </a:r>
+          </a:p>
+        </p:txBody>
+      </p:sp>
+      <p:cxnSp>
+        <p:nvCxnSpPr>
+          <p:cNvPr id="23" name="Straight Arrow Connector 22">
+            <a:extLst>
+              <a:ext uri="{FF2B5EF4-FFF2-40B4-BE49-F238E27FC236}">
+                <a16:creationId xmlns:a16="http://schemas.microsoft.com/office/drawing/2014/main" id="{5135333D-391C-E383-B552-47E9DF571387}"/>
+              </a:ext>
+            </a:extLst>
+          </p:cNvPr>
+          <p:cNvCxnSpPr>
+            <a:cxnSpLocks/>
+          </p:cNvCxnSpPr>
+          <p:nvPr/>
+        </p:nvCxnSpPr>
+        <p:spPr>
+          <a:xfrm>
+            <a:off x="1443408" y="2064106"/>
+            <a:ext cx="667826" cy="0"/>
+          </a:xfrm>
+          <a:prstGeom prst="straightConnector1">
+            <a:avLst/>
+          </a:prstGeom>
+          <a:ln w="57150">
+            <a:solidFill>
+              <a:schemeClr val="accent2"/>
+            </a:solidFill>
+            <a:tailEnd type="triangle"/>
+          </a:ln>
+        </p:spPr>
+        <p:style>
+          <a:lnRef idx="2">
+            <a:schemeClr val="accent1"/>
+          </a:lnRef>
+          <a:fillRef idx="0">
+            <a:schemeClr val="accent1"/>
+          </a:fillRef>
+          <a:effectRef idx="1">
+            <a:schemeClr val="accent1"/>
+          </a:effectRef>
+          <a:fontRef idx="minor">
+            <a:schemeClr val="tx1"/>
+          </a:fontRef>
+        </p:style>
+      </p:cxnSp>
+    </p:spTree>
+    <p:extLst>
+      <p:ext uri="{BB962C8B-B14F-4D97-AF65-F5344CB8AC3E}">
+        <p14:creationId xmlns:p14="http://schemas.microsoft.com/office/powerpoint/2010/main" val="3542071023"/>
+      </p:ext>
+    </p:extLst>
+  </p:cSld>
+  <p:clrMapOvr>
+    <a:masterClrMapping/>
+  </p:clrMapOvr>
+</p:sld>
+</file>
+
+<file path=ppt/slides/slide6.xml><?xml version="1.0" encoding="utf-8"?>
+<p:sld xmlns:a="http://schemas.openxmlformats.org/drawingml/2006/main" xmlns:r="http://schemas.openxmlformats.org/officeDocument/2006/relationships" xmlns:p="http://schemas.openxmlformats.org/presentationml/2006/main">
+  <p:cSld>
+    <p:spTree>
+      <p:nvGrpSpPr>
+        <p:cNvPr id="1" name=""/>
+        <p:cNvGrpSpPr/>
+        <p:nvPr/>
+      </p:nvGrpSpPr>
+      <p:grpSpPr>
+        <a:xfrm>
+          <a:off x="0" y="0"/>
+          <a:ext cx="0" cy="0"/>
+          <a:chOff x="0" y="0"/>
+          <a:chExt cx="0" cy="0"/>
+        </a:xfrm>
+      </p:grpSpPr>
+      <p:sp>
+        <p:nvSpPr>
+          <p:cNvPr id="2" name="Title 1">
+            <a:extLst>
+              <a:ext uri="{FF2B5EF4-FFF2-40B4-BE49-F238E27FC236}">
+                <a16:creationId xmlns:a16="http://schemas.microsoft.com/office/drawing/2014/main" id="{43AF91B8-5A27-2C29-1BEF-FC7D955BE7F6}"/>
+              </a:ext>
+            </a:extLst>
+          </p:cNvPr>
+          <p:cNvSpPr>
+            <a:spLocks noGrp="1"/>
+          </p:cNvSpPr>
+          <p:nvPr>
+            <p:ph type="ctrTitle"/>
+          </p:nvPr>
+        </p:nvSpPr>
+        <p:spPr/>
+        <p:txBody>
+          <a:bodyPr/>
+          <a:lstStyle/>
+          <a:p>
+            <a:r>
+              <a:rPr lang="en-US"/>
+              <a:t>InVEST pre-3.16</a:t>
+            </a:r>
+          </a:p>
+        </p:txBody>
+      </p:sp>
+    </p:spTree>
+    <p:extLst>
+      <p:ext uri="{BB962C8B-B14F-4D97-AF65-F5344CB8AC3E}">
+        <p14:creationId xmlns:p14="http://schemas.microsoft.com/office/powerpoint/2010/main" val="3081234207"/>
+      </p:ext>
+    </p:extLst>
+  </p:cSld>
+  <p:clrMapOvr>
+    <a:masterClrMapping/>
+  </p:clrMapOvr>
+</p:sld>
+</file>
+
+<file path=ppt/slides/slide7.xml><?xml version="1.0" encoding="utf-8"?>
 <p:sld xmlns:a="http://schemas.openxmlformats.org/drawingml/2006/main" xmlns:r="http://schemas.openxmlformats.org/officeDocument/2006/relationships" xmlns:p="http://schemas.openxmlformats.org/presentationml/2006/main">
   <p:cSld>
     <p:spTree>
@@ -3905,6 +6677,555 @@
       </p:pic>
       <p:sp>
         <p:nvSpPr>
+          <p:cNvPr id="6" name="TextBox 5">
+            <a:extLst>
+              <a:ext uri="{FF2B5EF4-FFF2-40B4-BE49-F238E27FC236}">
+                <a16:creationId xmlns:a16="http://schemas.microsoft.com/office/drawing/2014/main" id="{BD3DD0F5-4ED4-B11B-76A7-BFF45055FC3A}"/>
+              </a:ext>
+            </a:extLst>
+          </p:cNvPr>
+          <p:cNvSpPr txBox="1"/>
+          <p:nvPr/>
+        </p:nvSpPr>
+        <p:spPr>
+          <a:xfrm>
+            <a:off x="3198649" y="669349"/>
+            <a:ext cx="1746953" cy="369332"/>
+          </a:xfrm>
+          <a:prstGeom prst="rect">
+            <a:avLst/>
+          </a:prstGeom>
+          <a:noFill/>
+        </p:spPr>
+        <p:txBody>
+          <a:bodyPr wrap="none" rtlCol="0">
+            <a:spAutoFit/>
+          </a:bodyPr>
+          <a:lstStyle/>
+          <a:p>
+            <a:r>
+              <a:rPr lang="en-US" b="1"/>
+              <a:t>InVEST models</a:t>
+            </a:r>
+          </a:p>
+        </p:txBody>
+      </p:sp>
+      <p:sp>
+        <p:nvSpPr>
+          <p:cNvPr id="7" name="TextBox 6">
+            <a:extLst>
+              <a:ext uri="{FF2B5EF4-FFF2-40B4-BE49-F238E27FC236}">
+                <a16:creationId xmlns:a16="http://schemas.microsoft.com/office/drawing/2014/main" id="{02DC95A2-E121-41CE-9268-61BA294D4808}"/>
+              </a:ext>
+            </a:extLst>
+          </p:cNvPr>
+          <p:cNvSpPr txBox="1"/>
+          <p:nvPr/>
+        </p:nvSpPr>
+        <p:spPr>
+          <a:xfrm>
+            <a:off x="1687902" y="392351"/>
+            <a:ext cx="901850" cy="646331"/>
+          </a:xfrm>
+          <a:prstGeom prst="rect">
+            <a:avLst/>
+          </a:prstGeom>
+          <a:noFill/>
+        </p:spPr>
+        <p:txBody>
+          <a:bodyPr wrap="none" rtlCol="0">
+            <a:spAutoFit/>
+          </a:bodyPr>
+          <a:lstStyle/>
+          <a:p>
+            <a:pPr algn="ctr"/>
+            <a:r>
+              <a:rPr lang="en-US" b="1"/>
+              <a:t>Home</a:t>
+            </a:r>
+          </a:p>
+          <a:p>
+            <a:pPr algn="ctr"/>
+            <a:r>
+              <a:rPr lang="en-US" b="1"/>
+              <a:t>screen</a:t>
+            </a:r>
+          </a:p>
+        </p:txBody>
+      </p:sp>
+      <p:sp>
+        <p:nvSpPr>
+          <p:cNvPr id="8" name="TextBox 7">
+            <a:extLst>
+              <a:ext uri="{FF2B5EF4-FFF2-40B4-BE49-F238E27FC236}">
+                <a16:creationId xmlns:a16="http://schemas.microsoft.com/office/drawing/2014/main" id="{A783F852-105F-259A-E75C-523ED58FA22C}"/>
+              </a:ext>
+            </a:extLst>
+          </p:cNvPr>
+          <p:cNvSpPr txBox="1"/>
+          <p:nvPr/>
+        </p:nvSpPr>
+        <p:spPr>
+          <a:xfrm>
+            <a:off x="7105291" y="392350"/>
+            <a:ext cx="1372492" cy="646331"/>
+          </a:xfrm>
+          <a:prstGeom prst="rect">
+            <a:avLst/>
+          </a:prstGeom>
+          <a:noFill/>
+        </p:spPr>
+        <p:txBody>
+          <a:bodyPr wrap="none" rtlCol="0">
+            <a:spAutoFit/>
+          </a:bodyPr>
+          <a:lstStyle/>
+          <a:p>
+            <a:pPr algn="ctr"/>
+            <a:r>
+              <a:rPr lang="en-US" b="1"/>
+              <a:t>Previous </a:t>
+            </a:r>
+          </a:p>
+          <a:p>
+            <a:pPr algn="ctr"/>
+            <a:r>
+              <a:rPr lang="en-US" b="1"/>
+              <a:t>model runs</a:t>
+            </a:r>
+          </a:p>
+        </p:txBody>
+      </p:sp>
+      <p:sp>
+        <p:nvSpPr>
+          <p:cNvPr id="9" name="TextBox 8">
+            <a:extLst>
+              <a:ext uri="{FF2B5EF4-FFF2-40B4-BE49-F238E27FC236}">
+                <a16:creationId xmlns:a16="http://schemas.microsoft.com/office/drawing/2014/main" id="{A42F9C0B-24CB-877D-E4EF-EDBDEC941542}"/>
+              </a:ext>
+            </a:extLst>
+          </p:cNvPr>
+          <p:cNvSpPr txBox="1"/>
+          <p:nvPr/>
+        </p:nvSpPr>
+        <p:spPr>
+          <a:xfrm>
+            <a:off x="10032101" y="392350"/>
+            <a:ext cx="1500539" cy="646331"/>
+          </a:xfrm>
+          <a:prstGeom prst="rect">
+            <a:avLst/>
+          </a:prstGeom>
+          <a:noFill/>
+        </p:spPr>
+        <p:txBody>
+          <a:bodyPr wrap="none" rtlCol="0">
+            <a:spAutoFit/>
+          </a:bodyPr>
+          <a:lstStyle/>
+          <a:p>
+            <a:pPr algn="ctr"/>
+            <a:r>
+              <a:rPr lang="en-US" b="1"/>
+              <a:t>Settings/</a:t>
+            </a:r>
+          </a:p>
+          <a:p>
+            <a:pPr algn="ctr"/>
+            <a:r>
+              <a:rPr lang="en-US" b="1"/>
+              <a:t>Sample data</a:t>
+            </a:r>
+          </a:p>
+        </p:txBody>
+      </p:sp>
+      <p:cxnSp>
+        <p:nvCxnSpPr>
+          <p:cNvPr id="11" name="Straight Arrow Connector 10">
+            <a:extLst>
+              <a:ext uri="{FF2B5EF4-FFF2-40B4-BE49-F238E27FC236}">
+                <a16:creationId xmlns:a16="http://schemas.microsoft.com/office/drawing/2014/main" id="{7F1D104B-3E88-D027-55CD-F6673E9F405D}"/>
+              </a:ext>
+            </a:extLst>
+          </p:cNvPr>
+          <p:cNvCxnSpPr>
+            <a:cxnSpLocks/>
+            <a:stCxn id="7" idx="2"/>
+          </p:cNvCxnSpPr>
+          <p:nvPr/>
+        </p:nvCxnSpPr>
+        <p:spPr>
+          <a:xfrm>
+            <a:off x="2138827" y="1038682"/>
+            <a:ext cx="0" cy="669348"/>
+          </a:xfrm>
+          <a:prstGeom prst="straightConnector1">
+            <a:avLst/>
+          </a:prstGeom>
+          <a:ln w="76200">
+            <a:solidFill>
+              <a:schemeClr val="accent2"/>
+            </a:solidFill>
+            <a:tailEnd type="triangle"/>
+          </a:ln>
+        </p:spPr>
+        <p:style>
+          <a:lnRef idx="2">
+            <a:schemeClr val="accent1"/>
+          </a:lnRef>
+          <a:fillRef idx="0">
+            <a:schemeClr val="accent1"/>
+          </a:fillRef>
+          <a:effectRef idx="1">
+            <a:schemeClr val="accent1"/>
+          </a:effectRef>
+          <a:fontRef idx="minor">
+            <a:schemeClr val="tx1"/>
+          </a:fontRef>
+        </p:style>
+      </p:cxnSp>
+      <p:sp>
+        <p:nvSpPr>
+          <p:cNvPr id="15" name="Rectangle 14">
+            <a:extLst>
+              <a:ext uri="{FF2B5EF4-FFF2-40B4-BE49-F238E27FC236}">
+                <a16:creationId xmlns:a16="http://schemas.microsoft.com/office/drawing/2014/main" id="{538CE5C5-269B-DD1A-93F0-1E15E06AC1DD}"/>
+              </a:ext>
+            </a:extLst>
+          </p:cNvPr>
+          <p:cNvSpPr/>
+          <p:nvPr/>
+        </p:nvSpPr>
+        <p:spPr>
+          <a:xfrm>
+            <a:off x="1535502" y="1708030"/>
+            <a:ext cx="1224951" cy="405442"/>
+          </a:xfrm>
+          <a:prstGeom prst="rect">
+            <a:avLst/>
+          </a:prstGeom>
+          <a:noFill/>
+          <a:ln w="57150">
+            <a:solidFill>
+              <a:schemeClr val="accent2"/>
+            </a:solidFill>
+          </a:ln>
+        </p:spPr>
+        <p:style>
+          <a:lnRef idx="2">
+            <a:schemeClr val="accent1">
+              <a:shade val="15000"/>
+            </a:schemeClr>
+          </a:lnRef>
+          <a:fillRef idx="1">
+            <a:schemeClr val="accent1"/>
+          </a:fillRef>
+          <a:effectRef idx="0">
+            <a:schemeClr val="accent1"/>
+          </a:effectRef>
+          <a:fontRef idx="minor">
+            <a:schemeClr val="lt1"/>
+          </a:fontRef>
+        </p:style>
+        <p:txBody>
+          <a:bodyPr rtlCol="0" anchor="ctr"/>
+          <a:lstStyle/>
+          <a:p>
+            <a:pPr algn="ctr"/>
+            <a:endParaRPr lang="en-US"/>
+          </a:p>
+        </p:txBody>
+      </p:sp>
+      <p:cxnSp>
+        <p:nvCxnSpPr>
+          <p:cNvPr id="16" name="Straight Arrow Connector 15">
+            <a:extLst>
+              <a:ext uri="{FF2B5EF4-FFF2-40B4-BE49-F238E27FC236}">
+                <a16:creationId xmlns:a16="http://schemas.microsoft.com/office/drawing/2014/main" id="{7AE5E757-F375-5291-6EAD-24A1F9AC78C1}"/>
+              </a:ext>
+            </a:extLst>
+          </p:cNvPr>
+          <p:cNvCxnSpPr>
+            <a:cxnSpLocks/>
+          </p:cNvCxnSpPr>
+          <p:nvPr/>
+        </p:nvCxnSpPr>
+        <p:spPr>
+          <a:xfrm flipH="1">
+            <a:off x="3193077" y="1038682"/>
+            <a:ext cx="642278" cy="1273197"/>
+          </a:xfrm>
+          <a:prstGeom prst="straightConnector1">
+            <a:avLst/>
+          </a:prstGeom>
+          <a:ln w="76200">
+            <a:solidFill>
+              <a:schemeClr val="accent2"/>
+            </a:solidFill>
+            <a:tailEnd type="triangle"/>
+          </a:ln>
+        </p:spPr>
+        <p:style>
+          <a:lnRef idx="2">
+            <a:schemeClr val="accent1"/>
+          </a:lnRef>
+          <a:fillRef idx="0">
+            <a:schemeClr val="accent1"/>
+          </a:fillRef>
+          <a:effectRef idx="1">
+            <a:schemeClr val="accent1"/>
+          </a:effectRef>
+          <a:fontRef idx="minor">
+            <a:schemeClr val="tx1"/>
+          </a:fontRef>
+        </p:style>
+      </p:cxnSp>
+      <p:cxnSp>
+        <p:nvCxnSpPr>
+          <p:cNvPr id="18" name="Straight Arrow Connector 17">
+            <a:extLst>
+              <a:ext uri="{FF2B5EF4-FFF2-40B4-BE49-F238E27FC236}">
+                <a16:creationId xmlns:a16="http://schemas.microsoft.com/office/drawing/2014/main" id="{88F48D4D-E95A-76AF-CB24-E43FF18E2D00}"/>
+              </a:ext>
+            </a:extLst>
+          </p:cNvPr>
+          <p:cNvCxnSpPr>
+            <a:cxnSpLocks/>
+          </p:cNvCxnSpPr>
+          <p:nvPr/>
+        </p:nvCxnSpPr>
+        <p:spPr>
+          <a:xfrm>
+            <a:off x="4301181" y="1038681"/>
+            <a:ext cx="644421" cy="1273198"/>
+          </a:xfrm>
+          <a:prstGeom prst="straightConnector1">
+            <a:avLst/>
+          </a:prstGeom>
+          <a:ln w="76200">
+            <a:solidFill>
+              <a:schemeClr val="accent2"/>
+            </a:solidFill>
+            <a:tailEnd type="triangle"/>
+          </a:ln>
+        </p:spPr>
+        <p:style>
+          <a:lnRef idx="2">
+            <a:schemeClr val="accent1"/>
+          </a:lnRef>
+          <a:fillRef idx="0">
+            <a:schemeClr val="accent1"/>
+          </a:fillRef>
+          <a:effectRef idx="1">
+            <a:schemeClr val="accent1"/>
+          </a:effectRef>
+          <a:fontRef idx="minor">
+            <a:schemeClr val="tx1"/>
+          </a:fontRef>
+        </p:style>
+      </p:cxnSp>
+      <p:cxnSp>
+        <p:nvCxnSpPr>
+          <p:cNvPr id="22" name="Straight Arrow Connector 21">
+            <a:extLst>
+              <a:ext uri="{FF2B5EF4-FFF2-40B4-BE49-F238E27FC236}">
+                <a16:creationId xmlns:a16="http://schemas.microsoft.com/office/drawing/2014/main" id="{17E84CD8-F2B9-6592-3E04-2884D007BADF}"/>
+              </a:ext>
+            </a:extLst>
+          </p:cNvPr>
+          <p:cNvCxnSpPr>
+            <a:cxnSpLocks/>
+          </p:cNvCxnSpPr>
+          <p:nvPr/>
+        </p:nvCxnSpPr>
+        <p:spPr>
+          <a:xfrm>
+            <a:off x="7791537" y="1038681"/>
+            <a:ext cx="0" cy="1135176"/>
+          </a:xfrm>
+          <a:prstGeom prst="straightConnector1">
+            <a:avLst/>
+          </a:prstGeom>
+          <a:ln w="76200">
+            <a:solidFill>
+              <a:schemeClr val="accent2"/>
+            </a:solidFill>
+            <a:tailEnd type="triangle"/>
+          </a:ln>
+        </p:spPr>
+        <p:style>
+          <a:lnRef idx="2">
+            <a:schemeClr val="accent1"/>
+          </a:lnRef>
+          <a:fillRef idx="0">
+            <a:schemeClr val="accent1"/>
+          </a:fillRef>
+          <a:effectRef idx="1">
+            <a:schemeClr val="accent1"/>
+          </a:effectRef>
+          <a:fontRef idx="minor">
+            <a:schemeClr val="tx1"/>
+          </a:fontRef>
+        </p:style>
+      </p:cxnSp>
+      <p:cxnSp>
+        <p:nvCxnSpPr>
+          <p:cNvPr id="24" name="Straight Arrow Connector 23">
+            <a:extLst>
+              <a:ext uri="{FF2B5EF4-FFF2-40B4-BE49-F238E27FC236}">
+                <a16:creationId xmlns:a16="http://schemas.microsoft.com/office/drawing/2014/main" id="{3F7D70D8-0CC7-93F8-73F8-4679AA18F256}"/>
+              </a:ext>
+            </a:extLst>
+          </p:cNvPr>
+          <p:cNvCxnSpPr>
+            <a:cxnSpLocks/>
+          </p:cNvCxnSpPr>
+          <p:nvPr/>
+        </p:nvCxnSpPr>
+        <p:spPr>
+          <a:xfrm>
+            <a:off x="10782370" y="1038681"/>
+            <a:ext cx="0" cy="669349"/>
+          </a:xfrm>
+          <a:prstGeom prst="straightConnector1">
+            <a:avLst/>
+          </a:prstGeom>
+          <a:ln w="76200">
+            <a:solidFill>
+              <a:schemeClr val="accent2"/>
+            </a:solidFill>
+            <a:tailEnd type="triangle"/>
+          </a:ln>
+        </p:spPr>
+        <p:style>
+          <a:lnRef idx="2">
+            <a:schemeClr val="accent1"/>
+          </a:lnRef>
+          <a:fillRef idx="0">
+            <a:schemeClr val="accent1"/>
+          </a:fillRef>
+          <a:effectRef idx="1">
+            <a:schemeClr val="accent1"/>
+          </a:effectRef>
+          <a:fontRef idx="minor">
+            <a:schemeClr val="tx1"/>
+          </a:fontRef>
+        </p:style>
+      </p:cxnSp>
+      <p:sp>
+        <p:nvSpPr>
+          <p:cNvPr id="26" name="Rectangle 25">
+            <a:extLst>
+              <a:ext uri="{FF2B5EF4-FFF2-40B4-BE49-F238E27FC236}">
+                <a16:creationId xmlns:a16="http://schemas.microsoft.com/office/drawing/2014/main" id="{20D925C7-EC38-EEFF-E0D2-D8595EC629A4}"/>
+              </a:ext>
+            </a:extLst>
+          </p:cNvPr>
+          <p:cNvSpPr/>
+          <p:nvPr/>
+        </p:nvSpPr>
+        <p:spPr>
+          <a:xfrm>
+            <a:off x="10575985" y="1731352"/>
+            <a:ext cx="421728" cy="382120"/>
+          </a:xfrm>
+          <a:prstGeom prst="rect">
+            <a:avLst/>
+          </a:prstGeom>
+          <a:noFill/>
+          <a:ln w="57150">
+            <a:solidFill>
+              <a:schemeClr val="accent2"/>
+            </a:solidFill>
+          </a:ln>
+        </p:spPr>
+        <p:style>
+          <a:lnRef idx="2">
+            <a:schemeClr val="accent1">
+              <a:shade val="15000"/>
+            </a:schemeClr>
+          </a:lnRef>
+          <a:fillRef idx="1">
+            <a:schemeClr val="accent1"/>
+          </a:fillRef>
+          <a:effectRef idx="0">
+            <a:schemeClr val="accent1"/>
+          </a:effectRef>
+          <a:fontRef idx="minor">
+            <a:schemeClr val="lt1"/>
+          </a:fontRef>
+        </p:style>
+        <p:txBody>
+          <a:bodyPr rtlCol="0" anchor="ctr"/>
+          <a:lstStyle/>
+          <a:p>
+            <a:pPr algn="ctr"/>
+            <a:endParaRPr lang="en-US"/>
+          </a:p>
+        </p:txBody>
+      </p:sp>
+    </p:spTree>
+    <p:extLst>
+      <p:ext uri="{BB962C8B-B14F-4D97-AF65-F5344CB8AC3E}">
+        <p14:creationId xmlns:p14="http://schemas.microsoft.com/office/powerpoint/2010/main" val="3765661946"/>
+      </p:ext>
+    </p:extLst>
+  </p:cSld>
+  <p:clrMapOvr>
+    <a:masterClrMapping/>
+  </p:clrMapOvr>
+</p:sld>
+</file>
+
+<file path=ppt/slides/slide8.xml><?xml version="1.0" encoding="utf-8"?>
+<p:sld xmlns:a="http://schemas.openxmlformats.org/drawingml/2006/main" xmlns:r="http://schemas.openxmlformats.org/officeDocument/2006/relationships" xmlns:p="http://schemas.openxmlformats.org/presentationml/2006/main">
+  <p:cSld>
+    <p:spTree>
+      <p:nvGrpSpPr>
+        <p:cNvPr id="1" name=""/>
+        <p:cNvGrpSpPr/>
+        <p:nvPr/>
+      </p:nvGrpSpPr>
+      <p:grpSpPr>
+        <a:xfrm>
+          <a:off x="0" y="0"/>
+          <a:ext cx="0" cy="0"/>
+          <a:chOff x="0" y="0"/>
+          <a:chExt cx="0" cy="0"/>
+        </a:xfrm>
+      </p:grpSpPr>
+      <p:pic>
+        <p:nvPicPr>
+          <p:cNvPr id="5" name="Picture 4">
+            <a:extLst>
+              <a:ext uri="{FF2B5EF4-FFF2-40B4-BE49-F238E27FC236}">
+                <a16:creationId xmlns:a16="http://schemas.microsoft.com/office/drawing/2014/main" id="{1FAFF845-3623-3B72-E2B4-BB9FABA01FFA}"/>
+              </a:ext>
+            </a:extLst>
+          </p:cNvPr>
+          <p:cNvPicPr>
+            <a:picLocks noChangeAspect="1"/>
+          </p:cNvPicPr>
+          <p:nvPr/>
+        </p:nvPicPr>
+        <p:blipFill>
+          <a:blip r:embed="rId2"/>
+          <a:stretch>
+            <a:fillRect/>
+          </a:stretch>
+        </p:blipFill>
+        <p:spPr>
+          <a:xfrm>
+            <a:off x="1535502" y="1282035"/>
+            <a:ext cx="9462210" cy="5481073"/>
+          </a:xfrm>
+          <a:prstGeom prst="rect">
+            <a:avLst/>
+          </a:prstGeom>
+        </p:spPr>
+      </p:pic>
+      <p:sp>
+        <p:nvSpPr>
           <p:cNvPr id="9" name="TextBox 8">
             <a:extLst>
               <a:ext uri="{FF2B5EF4-FFF2-40B4-BE49-F238E27FC236}">
@@ -4055,7 +7376,7 @@
 </p:sld>
 </file>
 
-<file path=ppt/slides/slide3.xml><?xml version="1.0" encoding="utf-8"?>
+<file path=ppt/slides/slide9.xml><?xml version="1.0" encoding="utf-8"?>
 <p:sld xmlns:a="http://schemas.openxmlformats.org/drawingml/2006/main" xmlns:r="http://schemas.openxmlformats.org/officeDocument/2006/relationships" xmlns:p="http://schemas.openxmlformats.org/presentationml/2006/main">
   <p:cSld>
     <p:spTree>
@@ -4786,404 +8107,6 @@
     <p:extLst>
       <p:ext uri="{BB962C8B-B14F-4D97-AF65-F5344CB8AC3E}">
         <p14:creationId xmlns:p14="http://schemas.microsoft.com/office/powerpoint/2010/main" val="3238096088"/>
-      </p:ext>
-    </p:extLst>
-  </p:cSld>
-  <p:clrMapOvr>
-    <a:masterClrMapping/>
-  </p:clrMapOvr>
-</p:sld>
-</file>
-
-<file path=ppt/slides/slide4.xml><?xml version="1.0" encoding="utf-8"?>
-<p:sld xmlns:a="http://schemas.openxmlformats.org/drawingml/2006/main" xmlns:r="http://schemas.openxmlformats.org/officeDocument/2006/relationships" xmlns:p="http://schemas.openxmlformats.org/presentationml/2006/main">
-  <p:cSld>
-    <p:spTree>
-      <p:nvGrpSpPr>
-        <p:cNvPr id="1" name=""/>
-        <p:cNvGrpSpPr/>
-        <p:nvPr/>
-      </p:nvGrpSpPr>
-      <p:grpSpPr>
-        <a:xfrm>
-          <a:off x="0" y="0"/>
-          <a:ext cx="0" cy="0"/>
-          <a:chOff x="0" y="0"/>
-          <a:chExt cx="0" cy="0"/>
-        </a:xfrm>
-      </p:grpSpPr>
-      <p:pic>
-        <p:nvPicPr>
-          <p:cNvPr id="3" name="Picture 2">
-            <a:extLst>
-              <a:ext uri="{FF2B5EF4-FFF2-40B4-BE49-F238E27FC236}">
-                <a16:creationId xmlns:a16="http://schemas.microsoft.com/office/drawing/2014/main" id="{A385944C-64A2-3A34-B15E-A32D6BEE4DE2}"/>
-              </a:ext>
-            </a:extLst>
-          </p:cNvPr>
-          <p:cNvPicPr>
-            <a:picLocks noChangeAspect="1"/>
-          </p:cNvPicPr>
-          <p:nvPr/>
-        </p:nvPicPr>
-        <p:blipFill>
-          <a:blip r:embed="rId2"/>
-          <a:stretch>
-            <a:fillRect/>
-          </a:stretch>
-        </p:blipFill>
-        <p:spPr>
-          <a:xfrm>
-            <a:off x="2111234" y="1266614"/>
-            <a:ext cx="9598854" cy="5477256"/>
-          </a:xfrm>
-          <a:prstGeom prst="rect">
-            <a:avLst/>
-          </a:prstGeom>
-        </p:spPr>
-      </p:pic>
-      <p:sp>
-        <p:nvSpPr>
-          <p:cNvPr id="7" name="TextBox 6">
-            <a:extLst>
-              <a:ext uri="{FF2B5EF4-FFF2-40B4-BE49-F238E27FC236}">
-                <a16:creationId xmlns:a16="http://schemas.microsoft.com/office/drawing/2014/main" id="{02DC95A2-E121-41CE-9268-61BA294D4808}"/>
-              </a:ext>
-            </a:extLst>
-          </p:cNvPr>
-          <p:cNvSpPr txBox="1"/>
-          <p:nvPr/>
-        </p:nvSpPr>
-        <p:spPr>
-          <a:xfrm>
-            <a:off x="190836" y="2519393"/>
-            <a:ext cx="1778158" cy="738664"/>
-          </a:xfrm>
-          <a:prstGeom prst="rect">
-            <a:avLst/>
-          </a:prstGeom>
-          <a:noFill/>
-        </p:spPr>
-        <p:txBody>
-          <a:bodyPr wrap="square" rtlCol="0">
-            <a:spAutoFit/>
-          </a:bodyPr>
-          <a:lstStyle/>
-          <a:p>
-            <a:r>
-              <a:rPr lang="en-US" sz="1400" b="1"/>
-              <a:t>Click to view logging messages for this model run </a:t>
-            </a:r>
-          </a:p>
-        </p:txBody>
-      </p:sp>
-      <p:sp>
-        <p:nvSpPr>
-          <p:cNvPr id="8" name="TextBox 7">
-            <a:extLst>
-              <a:ext uri="{FF2B5EF4-FFF2-40B4-BE49-F238E27FC236}">
-                <a16:creationId xmlns:a16="http://schemas.microsoft.com/office/drawing/2014/main" id="{A783F852-105F-259A-E75C-523ED58FA22C}"/>
-              </a:ext>
-            </a:extLst>
-          </p:cNvPr>
-          <p:cNvSpPr txBox="1"/>
-          <p:nvPr/>
-        </p:nvSpPr>
-        <p:spPr>
-          <a:xfrm>
-            <a:off x="7744952" y="392350"/>
-            <a:ext cx="1244636" cy="646331"/>
-          </a:xfrm>
-          <a:prstGeom prst="rect">
-            <a:avLst/>
-          </a:prstGeom>
-          <a:noFill/>
-        </p:spPr>
-        <p:txBody>
-          <a:bodyPr wrap="none" rtlCol="0">
-            <a:spAutoFit/>
-          </a:bodyPr>
-          <a:lstStyle/>
-          <a:p>
-            <a:pPr algn="ctr"/>
-            <a:r>
-              <a:rPr lang="en-US" b="1"/>
-              <a:t>Logging</a:t>
-            </a:r>
-          </a:p>
-          <a:p>
-            <a:pPr algn="ctr"/>
-            <a:r>
-              <a:rPr lang="en-US" b="1"/>
-              <a:t>messages</a:t>
-            </a:r>
-          </a:p>
-        </p:txBody>
-      </p:sp>
-      <p:cxnSp>
-        <p:nvCxnSpPr>
-          <p:cNvPr id="11" name="Straight Arrow Connector 10">
-            <a:extLst>
-              <a:ext uri="{FF2B5EF4-FFF2-40B4-BE49-F238E27FC236}">
-                <a16:creationId xmlns:a16="http://schemas.microsoft.com/office/drawing/2014/main" id="{7F1D104B-3E88-D027-55CD-F6673E9F405D}"/>
-              </a:ext>
-            </a:extLst>
-          </p:cNvPr>
-          <p:cNvCxnSpPr>
-            <a:cxnSpLocks/>
-          </p:cNvCxnSpPr>
-          <p:nvPr/>
-        </p:nvCxnSpPr>
-        <p:spPr>
-          <a:xfrm>
-            <a:off x="1443408" y="2673865"/>
-            <a:ext cx="667826" cy="0"/>
-          </a:xfrm>
-          <a:prstGeom prst="straightConnector1">
-            <a:avLst/>
-          </a:prstGeom>
-          <a:ln w="57150">
-            <a:solidFill>
-              <a:schemeClr val="accent2"/>
-            </a:solidFill>
-            <a:tailEnd type="triangle"/>
-          </a:ln>
-        </p:spPr>
-        <p:style>
-          <a:lnRef idx="2">
-            <a:schemeClr val="accent1"/>
-          </a:lnRef>
-          <a:fillRef idx="0">
-            <a:schemeClr val="accent1"/>
-          </a:fillRef>
-          <a:effectRef idx="1">
-            <a:schemeClr val="accent1"/>
-          </a:effectRef>
-          <a:fontRef idx="minor">
-            <a:schemeClr val="tx1"/>
-          </a:fontRef>
-        </p:style>
-      </p:cxnSp>
-      <p:cxnSp>
-        <p:nvCxnSpPr>
-          <p:cNvPr id="22" name="Straight Arrow Connector 21">
-            <a:extLst>
-              <a:ext uri="{FF2B5EF4-FFF2-40B4-BE49-F238E27FC236}">
-                <a16:creationId xmlns:a16="http://schemas.microsoft.com/office/drawing/2014/main" id="{17E84CD8-F2B9-6592-3E04-2884D007BADF}"/>
-              </a:ext>
-            </a:extLst>
-          </p:cNvPr>
-          <p:cNvCxnSpPr>
-            <a:cxnSpLocks/>
-          </p:cNvCxnSpPr>
-          <p:nvPr/>
-        </p:nvCxnSpPr>
-        <p:spPr>
-          <a:xfrm>
-            <a:off x="8367269" y="1038681"/>
-            <a:ext cx="1" cy="1203292"/>
-          </a:xfrm>
-          <a:prstGeom prst="straightConnector1">
-            <a:avLst/>
-          </a:prstGeom>
-          <a:ln w="76200">
-            <a:solidFill>
-              <a:schemeClr val="accent2"/>
-            </a:solidFill>
-            <a:tailEnd type="triangle"/>
-          </a:ln>
-        </p:spPr>
-        <p:style>
-          <a:lnRef idx="2">
-            <a:schemeClr val="accent1"/>
-          </a:lnRef>
-          <a:fillRef idx="0">
-            <a:schemeClr val="accent1"/>
-          </a:fillRef>
-          <a:effectRef idx="1">
-            <a:schemeClr val="accent1"/>
-          </a:effectRef>
-          <a:fontRef idx="minor">
-            <a:schemeClr val="tx1"/>
-          </a:fontRef>
-        </p:style>
-      </p:cxnSp>
-      <p:sp>
-        <p:nvSpPr>
-          <p:cNvPr id="4" name="TextBox 3">
-            <a:extLst>
-              <a:ext uri="{FF2B5EF4-FFF2-40B4-BE49-F238E27FC236}">
-                <a16:creationId xmlns:a16="http://schemas.microsoft.com/office/drawing/2014/main" id="{E5AE65B7-EF86-E397-6E44-144DF335D314}"/>
-              </a:ext>
-            </a:extLst>
-          </p:cNvPr>
-          <p:cNvSpPr txBox="1"/>
-          <p:nvPr/>
-        </p:nvSpPr>
-        <p:spPr>
-          <a:xfrm>
-            <a:off x="2880445" y="4372709"/>
-            <a:ext cx="1516441" cy="646331"/>
-          </a:xfrm>
-          <a:prstGeom prst="rect">
-            <a:avLst/>
-          </a:prstGeom>
-          <a:noFill/>
-        </p:spPr>
-        <p:txBody>
-          <a:bodyPr wrap="none" rtlCol="0">
-            <a:spAutoFit/>
-          </a:bodyPr>
-          <a:lstStyle/>
-          <a:p>
-            <a:pPr algn="ctr"/>
-            <a:r>
-              <a:rPr lang="en-US" b="1"/>
-              <a:t>Click to view</a:t>
-            </a:r>
-          </a:p>
-          <a:p>
-            <a:pPr algn="ctr"/>
-            <a:r>
-              <a:rPr lang="en-US" b="1"/>
-              <a:t>results</a:t>
-            </a:r>
-          </a:p>
-        </p:txBody>
-      </p:sp>
-      <p:cxnSp>
-        <p:nvCxnSpPr>
-          <p:cNvPr id="10" name="Straight Arrow Connector 9">
-            <a:extLst>
-              <a:ext uri="{FF2B5EF4-FFF2-40B4-BE49-F238E27FC236}">
-                <a16:creationId xmlns:a16="http://schemas.microsoft.com/office/drawing/2014/main" id="{0BA8099E-49B3-BDFD-C2E8-2E62635467DF}"/>
-              </a:ext>
-            </a:extLst>
-          </p:cNvPr>
-          <p:cNvCxnSpPr>
-            <a:cxnSpLocks/>
-          </p:cNvCxnSpPr>
-          <p:nvPr/>
-        </p:nvCxnSpPr>
-        <p:spPr>
-          <a:xfrm>
-            <a:off x="3638666" y="5019040"/>
-            <a:ext cx="0" cy="676887"/>
-          </a:xfrm>
-          <a:prstGeom prst="straightConnector1">
-            <a:avLst/>
-          </a:prstGeom>
-          <a:ln w="76200">
-            <a:solidFill>
-              <a:schemeClr val="accent2"/>
-            </a:solidFill>
-            <a:tailEnd type="triangle"/>
-          </a:ln>
-        </p:spPr>
-        <p:style>
-          <a:lnRef idx="2">
-            <a:schemeClr val="accent1"/>
-          </a:lnRef>
-          <a:fillRef idx="0">
-            <a:schemeClr val="accent1"/>
-          </a:fillRef>
-          <a:effectRef idx="1">
-            <a:schemeClr val="accent1"/>
-          </a:effectRef>
-          <a:fontRef idx="minor">
-            <a:schemeClr val="tx1"/>
-          </a:fontRef>
-        </p:style>
-      </p:cxnSp>
-      <p:sp>
-        <p:nvSpPr>
-          <p:cNvPr id="21" name="TextBox 20">
-            <a:extLst>
-              <a:ext uri="{FF2B5EF4-FFF2-40B4-BE49-F238E27FC236}">
-                <a16:creationId xmlns:a16="http://schemas.microsoft.com/office/drawing/2014/main" id="{527CD429-4E9C-2EDE-9474-2E7D7326E012}"/>
-              </a:ext>
-            </a:extLst>
-          </p:cNvPr>
-          <p:cNvSpPr txBox="1"/>
-          <p:nvPr/>
-        </p:nvSpPr>
-        <p:spPr>
-          <a:xfrm>
-            <a:off x="481912" y="1720342"/>
-            <a:ext cx="1939509" cy="738664"/>
-          </a:xfrm>
-          <a:prstGeom prst="rect">
-            <a:avLst/>
-          </a:prstGeom>
-          <a:noFill/>
-        </p:spPr>
-        <p:txBody>
-          <a:bodyPr wrap="square" rtlCol="0">
-            <a:spAutoFit/>
-          </a:bodyPr>
-          <a:lstStyle/>
-          <a:p>
-            <a:r>
-              <a:rPr lang="en-US" sz="1400" b="1"/>
-              <a:t>Click to return to </a:t>
-            </a:r>
-          </a:p>
-          <a:p>
-            <a:r>
-              <a:rPr lang="en-US" sz="1400" b="1"/>
-              <a:t>the model input screen</a:t>
-            </a:r>
-          </a:p>
-        </p:txBody>
-      </p:sp>
-      <p:cxnSp>
-        <p:nvCxnSpPr>
-          <p:cNvPr id="23" name="Straight Arrow Connector 22">
-            <a:extLst>
-              <a:ext uri="{FF2B5EF4-FFF2-40B4-BE49-F238E27FC236}">
-                <a16:creationId xmlns:a16="http://schemas.microsoft.com/office/drawing/2014/main" id="{9A85BA3A-E3E6-D4A6-B34A-C652731EC4C2}"/>
-              </a:ext>
-            </a:extLst>
-          </p:cNvPr>
-          <p:cNvCxnSpPr>
-            <a:cxnSpLocks/>
-          </p:cNvCxnSpPr>
-          <p:nvPr/>
-        </p:nvCxnSpPr>
-        <p:spPr>
-          <a:xfrm>
-            <a:off x="1443408" y="2320779"/>
-            <a:ext cx="667826" cy="0"/>
-          </a:xfrm>
-          <a:prstGeom prst="straightConnector1">
-            <a:avLst/>
-          </a:prstGeom>
-          <a:ln w="57150">
-            <a:solidFill>
-              <a:schemeClr val="accent2"/>
-            </a:solidFill>
-            <a:tailEnd type="triangle"/>
-          </a:ln>
-        </p:spPr>
-        <p:style>
-          <a:lnRef idx="2">
-            <a:schemeClr val="accent1"/>
-          </a:lnRef>
-          <a:fillRef idx="0">
-            <a:schemeClr val="accent1"/>
-          </a:fillRef>
-          <a:effectRef idx="1">
-            <a:schemeClr val="accent1"/>
-          </a:effectRef>
-          <a:fontRef idx="minor">
-            <a:schemeClr val="tx1"/>
-          </a:fontRef>
-        </p:style>
-      </p:cxnSp>
-    </p:spTree>
-    <p:extLst>
-      <p:ext uri="{BB962C8B-B14F-4D97-AF65-F5344CB8AC3E}">
-        <p14:creationId xmlns:p14="http://schemas.microsoft.com/office/powerpoint/2010/main" val="166539180"/>
       </p:ext>
     </p:extLst>
   </p:cSld>

</xml_diff>